<commit_message>
Update generated files and docs
Co-Authored-By: Claude Opus 4.6 <noreply@anthropic.com>
</commit_message>
<xml_diff>
--- a/docs/architecture.pptx
+++ b/docs/architecture.pptx
@@ -5,11 +5,13 @@
     <p:sldMasterId id="2147483648" r:id="rId1"/>
   </p:sldMasterIdLst>
   <p:notesMasterIdLst>
-    <p:notesMasterId r:id="rId4"/>
+    <p:notesMasterId r:id="rId6"/>
   </p:notesMasterIdLst>
   <p:sldIdLst>
     <p:sldId id="256" r:id="rId2"/>
     <p:sldId id="257" r:id="rId3"/>
+    <p:sldId id="258" r:id="rId4"/>
+    <p:sldId id="259" r:id="rId5"/>
   </p:sldIdLst>
   <p:sldSz cx="12192000" cy="6858000"/>
   <p:notesSz cx="6858000" cy="9144000"/>
@@ -123,6 +125,753 @@
 </file>
 
 <file path=ppt/diagrams/colors1.xml><?xml version="1.0" encoding="utf-8"?>
+<dgm:colorsDef xmlns:dgm="http://schemas.openxmlformats.org/drawingml/2006/diagram" xmlns:a="http://schemas.openxmlformats.org/drawingml/2006/main" uniqueId="urn:microsoft.com/office/officeart/2005/8/colors/accent1_2">
+  <dgm:title val=""/>
+  <dgm:desc val=""/>
+  <dgm:catLst>
+    <dgm:cat type="accent1" pri="11200"/>
+  </dgm:catLst>
+  <dgm:styleLbl name="node0">
+    <dgm:fillClrLst meth="repeat">
+      <a:schemeClr val="accent1"/>
+    </dgm:fillClrLst>
+    <dgm:linClrLst meth="repeat">
+      <a:schemeClr val="lt1"/>
+    </dgm:linClrLst>
+    <dgm:effectClrLst/>
+    <dgm:txLinClrLst/>
+    <dgm:txFillClrLst/>
+    <dgm:txEffectClrLst/>
+  </dgm:styleLbl>
+  <dgm:styleLbl name="alignNode1">
+    <dgm:fillClrLst meth="repeat">
+      <a:schemeClr val="accent1"/>
+    </dgm:fillClrLst>
+    <dgm:linClrLst meth="repeat">
+      <a:schemeClr val="accent1"/>
+    </dgm:linClrLst>
+    <dgm:effectClrLst/>
+    <dgm:txLinClrLst/>
+    <dgm:txFillClrLst/>
+    <dgm:txEffectClrLst/>
+  </dgm:styleLbl>
+  <dgm:styleLbl name="node1">
+    <dgm:fillClrLst meth="repeat">
+      <a:schemeClr val="accent1"/>
+    </dgm:fillClrLst>
+    <dgm:linClrLst meth="repeat">
+      <a:schemeClr val="lt1"/>
+    </dgm:linClrLst>
+    <dgm:effectClrLst/>
+    <dgm:txLinClrLst/>
+    <dgm:txFillClrLst/>
+    <dgm:txEffectClrLst/>
+  </dgm:styleLbl>
+  <dgm:styleLbl name="lnNode1">
+    <dgm:fillClrLst meth="repeat">
+      <a:schemeClr val="accent1"/>
+    </dgm:fillClrLst>
+    <dgm:linClrLst meth="repeat">
+      <a:schemeClr val="lt1"/>
+    </dgm:linClrLst>
+    <dgm:effectClrLst/>
+    <dgm:txLinClrLst/>
+    <dgm:txFillClrLst/>
+    <dgm:txEffectClrLst/>
+  </dgm:styleLbl>
+  <dgm:styleLbl name="vennNode1">
+    <dgm:fillClrLst meth="repeat">
+      <a:schemeClr val="accent1">
+        <a:alpha val="50000"/>
+      </a:schemeClr>
+    </dgm:fillClrLst>
+    <dgm:linClrLst meth="repeat">
+      <a:schemeClr val="lt1"/>
+    </dgm:linClrLst>
+    <dgm:effectClrLst/>
+    <dgm:txLinClrLst/>
+    <dgm:txFillClrLst/>
+    <dgm:txEffectClrLst/>
+  </dgm:styleLbl>
+  <dgm:styleLbl name="node2">
+    <dgm:fillClrLst meth="repeat">
+      <a:schemeClr val="accent1"/>
+    </dgm:fillClrLst>
+    <dgm:linClrLst meth="repeat">
+      <a:schemeClr val="lt1"/>
+    </dgm:linClrLst>
+    <dgm:effectClrLst/>
+    <dgm:txLinClrLst/>
+    <dgm:txFillClrLst/>
+    <dgm:txEffectClrLst/>
+  </dgm:styleLbl>
+  <dgm:styleLbl name="node3">
+    <dgm:fillClrLst meth="repeat">
+      <a:schemeClr val="accent1"/>
+    </dgm:fillClrLst>
+    <dgm:linClrLst meth="repeat">
+      <a:schemeClr val="lt1"/>
+    </dgm:linClrLst>
+    <dgm:effectClrLst/>
+    <dgm:txLinClrLst/>
+    <dgm:txFillClrLst/>
+    <dgm:txEffectClrLst/>
+  </dgm:styleLbl>
+  <dgm:styleLbl name="node4">
+    <dgm:fillClrLst meth="repeat">
+      <a:schemeClr val="accent1"/>
+    </dgm:fillClrLst>
+    <dgm:linClrLst meth="repeat">
+      <a:schemeClr val="lt1"/>
+    </dgm:linClrLst>
+    <dgm:effectClrLst/>
+    <dgm:txLinClrLst/>
+    <dgm:txFillClrLst/>
+    <dgm:txEffectClrLst/>
+  </dgm:styleLbl>
+  <dgm:styleLbl name="fgImgPlace1">
+    <dgm:fillClrLst meth="repeat">
+      <a:schemeClr val="accent1">
+        <a:tint val="50000"/>
+      </a:schemeClr>
+    </dgm:fillClrLst>
+    <dgm:linClrLst meth="repeat">
+      <a:schemeClr val="lt1"/>
+    </dgm:linClrLst>
+    <dgm:effectClrLst/>
+    <dgm:txLinClrLst/>
+    <dgm:txFillClrLst meth="repeat">
+      <a:schemeClr val="lt1"/>
+    </dgm:txFillClrLst>
+    <dgm:txEffectClrLst/>
+  </dgm:styleLbl>
+  <dgm:styleLbl name="alignImgPlace1">
+    <dgm:fillClrLst meth="repeat">
+      <a:schemeClr val="accent1">
+        <a:tint val="50000"/>
+      </a:schemeClr>
+    </dgm:fillClrLst>
+    <dgm:linClrLst meth="repeat">
+      <a:schemeClr val="lt1"/>
+    </dgm:linClrLst>
+    <dgm:effectClrLst/>
+    <dgm:txLinClrLst/>
+    <dgm:txFillClrLst meth="repeat">
+      <a:schemeClr val="lt1"/>
+    </dgm:txFillClrLst>
+    <dgm:txEffectClrLst/>
+  </dgm:styleLbl>
+  <dgm:styleLbl name="bgImgPlace1">
+    <dgm:fillClrLst meth="repeat">
+      <a:schemeClr val="accent1">
+        <a:tint val="50000"/>
+      </a:schemeClr>
+    </dgm:fillClrLst>
+    <dgm:linClrLst meth="repeat">
+      <a:schemeClr val="lt1"/>
+    </dgm:linClrLst>
+    <dgm:effectClrLst/>
+    <dgm:txLinClrLst/>
+    <dgm:txFillClrLst meth="repeat">
+      <a:schemeClr val="lt1"/>
+    </dgm:txFillClrLst>
+    <dgm:txEffectClrLst/>
+  </dgm:styleLbl>
+  <dgm:styleLbl name="sibTrans2D1">
+    <dgm:fillClrLst meth="repeat">
+      <a:schemeClr val="accent1">
+        <a:tint val="60000"/>
+      </a:schemeClr>
+    </dgm:fillClrLst>
+    <dgm:linClrLst meth="repeat">
+      <a:schemeClr val="accent1">
+        <a:tint val="60000"/>
+      </a:schemeClr>
+    </dgm:linClrLst>
+    <dgm:effectClrLst/>
+    <dgm:txLinClrLst/>
+    <dgm:txFillClrLst/>
+    <dgm:txEffectClrLst/>
+  </dgm:styleLbl>
+  <dgm:styleLbl name="fgSibTrans2D1">
+    <dgm:fillClrLst meth="repeat">
+      <a:schemeClr val="accent1">
+        <a:tint val="60000"/>
+      </a:schemeClr>
+    </dgm:fillClrLst>
+    <dgm:linClrLst meth="repeat">
+      <a:schemeClr val="accent1">
+        <a:tint val="60000"/>
+      </a:schemeClr>
+    </dgm:linClrLst>
+    <dgm:effectClrLst/>
+    <dgm:txLinClrLst/>
+    <dgm:txFillClrLst/>
+    <dgm:txEffectClrLst/>
+  </dgm:styleLbl>
+  <dgm:styleLbl name="bgSibTrans2D1">
+    <dgm:fillClrLst meth="repeat">
+      <a:schemeClr val="accent1">
+        <a:tint val="60000"/>
+      </a:schemeClr>
+    </dgm:fillClrLst>
+    <dgm:linClrLst meth="repeat">
+      <a:schemeClr val="accent1">
+        <a:tint val="60000"/>
+      </a:schemeClr>
+    </dgm:linClrLst>
+    <dgm:effectClrLst/>
+    <dgm:txLinClrLst/>
+    <dgm:txFillClrLst/>
+    <dgm:txEffectClrLst/>
+  </dgm:styleLbl>
+  <dgm:styleLbl name="sibTrans1D1">
+    <dgm:fillClrLst meth="repeat">
+      <a:schemeClr val="accent1"/>
+    </dgm:fillClrLst>
+    <dgm:linClrLst meth="repeat">
+      <a:schemeClr val="accent1"/>
+    </dgm:linClrLst>
+    <dgm:effectClrLst/>
+    <dgm:txLinClrLst/>
+    <dgm:txFillClrLst meth="repeat">
+      <a:schemeClr val="tx1"/>
+    </dgm:txFillClrLst>
+    <dgm:txEffectClrLst/>
+  </dgm:styleLbl>
+  <dgm:styleLbl name="callout">
+    <dgm:fillClrLst meth="repeat">
+      <a:schemeClr val="accent1"/>
+    </dgm:fillClrLst>
+    <dgm:linClrLst meth="repeat">
+      <a:schemeClr val="accent1">
+        <a:tint val="50000"/>
+      </a:schemeClr>
+    </dgm:linClrLst>
+    <dgm:effectClrLst/>
+    <dgm:txLinClrLst/>
+    <dgm:txFillClrLst meth="repeat">
+      <a:schemeClr val="tx1"/>
+    </dgm:txFillClrLst>
+    <dgm:txEffectClrLst/>
+  </dgm:styleLbl>
+  <dgm:styleLbl name="asst0">
+    <dgm:fillClrLst meth="repeat">
+      <a:schemeClr val="accent1"/>
+    </dgm:fillClrLst>
+    <dgm:linClrLst meth="repeat">
+      <a:schemeClr val="lt1"/>
+    </dgm:linClrLst>
+    <dgm:effectClrLst/>
+    <dgm:txLinClrLst/>
+    <dgm:txFillClrLst/>
+    <dgm:txEffectClrLst/>
+  </dgm:styleLbl>
+  <dgm:styleLbl name="asst1">
+    <dgm:fillClrLst meth="repeat">
+      <a:schemeClr val="accent1"/>
+    </dgm:fillClrLst>
+    <dgm:linClrLst meth="repeat">
+      <a:schemeClr val="lt1"/>
+    </dgm:linClrLst>
+    <dgm:effectClrLst/>
+    <dgm:txLinClrLst/>
+    <dgm:txFillClrLst/>
+    <dgm:txEffectClrLst/>
+  </dgm:styleLbl>
+  <dgm:styleLbl name="asst2">
+    <dgm:fillClrLst meth="repeat">
+      <a:schemeClr val="accent1"/>
+    </dgm:fillClrLst>
+    <dgm:linClrLst meth="repeat">
+      <a:schemeClr val="lt1"/>
+    </dgm:linClrLst>
+    <dgm:effectClrLst/>
+    <dgm:txLinClrLst/>
+    <dgm:txFillClrLst/>
+    <dgm:txEffectClrLst/>
+  </dgm:styleLbl>
+  <dgm:styleLbl name="asst3">
+    <dgm:fillClrLst meth="repeat">
+      <a:schemeClr val="accent1"/>
+    </dgm:fillClrLst>
+    <dgm:linClrLst meth="repeat">
+      <a:schemeClr val="lt1"/>
+    </dgm:linClrLst>
+    <dgm:effectClrLst/>
+    <dgm:txLinClrLst/>
+    <dgm:txFillClrLst/>
+    <dgm:txEffectClrLst/>
+  </dgm:styleLbl>
+  <dgm:styleLbl name="asst4">
+    <dgm:fillClrLst meth="repeat">
+      <a:schemeClr val="accent1"/>
+    </dgm:fillClrLst>
+    <dgm:linClrLst meth="repeat">
+      <a:schemeClr val="lt1"/>
+    </dgm:linClrLst>
+    <dgm:effectClrLst/>
+    <dgm:txLinClrLst/>
+    <dgm:txFillClrLst/>
+    <dgm:txEffectClrLst/>
+  </dgm:styleLbl>
+  <dgm:styleLbl name="parChTrans2D1">
+    <dgm:fillClrLst meth="repeat">
+      <a:schemeClr val="accent1">
+        <a:tint val="60000"/>
+      </a:schemeClr>
+    </dgm:fillClrLst>
+    <dgm:linClrLst meth="repeat">
+      <a:schemeClr val="accent1">
+        <a:tint val="60000"/>
+      </a:schemeClr>
+    </dgm:linClrLst>
+    <dgm:effectClrLst/>
+    <dgm:txLinClrLst/>
+    <dgm:txFillClrLst meth="repeat">
+      <a:schemeClr val="lt1"/>
+    </dgm:txFillClrLst>
+    <dgm:txEffectClrLst/>
+  </dgm:styleLbl>
+  <dgm:styleLbl name="parChTrans2D2">
+    <dgm:fillClrLst meth="repeat">
+      <a:schemeClr val="accent1"/>
+    </dgm:fillClrLst>
+    <dgm:linClrLst meth="repeat">
+      <a:schemeClr val="accent1"/>
+    </dgm:linClrLst>
+    <dgm:effectClrLst/>
+    <dgm:txLinClrLst/>
+    <dgm:txFillClrLst meth="repeat">
+      <a:schemeClr val="lt1"/>
+    </dgm:txFillClrLst>
+    <dgm:txEffectClrLst/>
+  </dgm:styleLbl>
+  <dgm:styleLbl name="parChTrans2D3">
+    <dgm:fillClrLst meth="repeat">
+      <a:schemeClr val="accent1"/>
+    </dgm:fillClrLst>
+    <dgm:linClrLst meth="repeat">
+      <a:schemeClr val="accent1"/>
+    </dgm:linClrLst>
+    <dgm:effectClrLst/>
+    <dgm:txLinClrLst/>
+    <dgm:txFillClrLst meth="repeat">
+      <a:schemeClr val="lt1"/>
+    </dgm:txFillClrLst>
+    <dgm:txEffectClrLst/>
+  </dgm:styleLbl>
+  <dgm:styleLbl name="parChTrans2D4">
+    <dgm:fillClrLst meth="repeat">
+      <a:schemeClr val="accent1"/>
+    </dgm:fillClrLst>
+    <dgm:linClrLst meth="repeat">
+      <a:schemeClr val="accent1"/>
+    </dgm:linClrLst>
+    <dgm:effectClrLst/>
+    <dgm:txLinClrLst/>
+    <dgm:txFillClrLst meth="repeat">
+      <a:schemeClr val="lt1"/>
+    </dgm:txFillClrLst>
+    <dgm:txEffectClrLst/>
+  </dgm:styleLbl>
+  <dgm:styleLbl name="parChTrans1D1">
+    <dgm:fillClrLst meth="repeat">
+      <a:schemeClr val="accent1"/>
+    </dgm:fillClrLst>
+    <dgm:linClrLst meth="repeat">
+      <a:schemeClr val="accent1">
+        <a:shade val="60000"/>
+      </a:schemeClr>
+    </dgm:linClrLst>
+    <dgm:effectClrLst/>
+    <dgm:txLinClrLst/>
+    <dgm:txFillClrLst meth="repeat">
+      <a:schemeClr val="tx1"/>
+    </dgm:txFillClrLst>
+    <dgm:txEffectClrLst/>
+  </dgm:styleLbl>
+  <dgm:styleLbl name="parChTrans1D2">
+    <dgm:fillClrLst meth="repeat">
+      <a:schemeClr val="accent1"/>
+    </dgm:fillClrLst>
+    <dgm:linClrLst meth="repeat">
+      <a:schemeClr val="accent1">
+        <a:shade val="60000"/>
+      </a:schemeClr>
+    </dgm:linClrLst>
+    <dgm:effectClrLst/>
+    <dgm:txLinClrLst/>
+    <dgm:txFillClrLst meth="repeat">
+      <a:schemeClr val="tx1"/>
+    </dgm:txFillClrLst>
+    <dgm:txEffectClrLst/>
+  </dgm:styleLbl>
+  <dgm:styleLbl name="parChTrans1D3">
+    <dgm:fillClrLst meth="repeat">
+      <a:schemeClr val="accent1"/>
+    </dgm:fillClrLst>
+    <dgm:linClrLst meth="repeat">
+      <a:schemeClr val="accent1">
+        <a:shade val="80000"/>
+      </a:schemeClr>
+    </dgm:linClrLst>
+    <dgm:effectClrLst/>
+    <dgm:txLinClrLst/>
+    <dgm:txFillClrLst meth="repeat">
+      <a:schemeClr val="tx1"/>
+    </dgm:txFillClrLst>
+    <dgm:txEffectClrLst/>
+  </dgm:styleLbl>
+  <dgm:styleLbl name="parChTrans1D4">
+    <dgm:fillClrLst meth="repeat">
+      <a:schemeClr val="accent1"/>
+    </dgm:fillClrLst>
+    <dgm:linClrLst meth="repeat">
+      <a:schemeClr val="accent1">
+        <a:shade val="80000"/>
+      </a:schemeClr>
+    </dgm:linClrLst>
+    <dgm:effectClrLst/>
+    <dgm:txLinClrLst/>
+    <dgm:txFillClrLst meth="repeat">
+      <a:schemeClr val="tx1"/>
+    </dgm:txFillClrLst>
+    <dgm:txEffectClrLst/>
+  </dgm:styleLbl>
+  <dgm:styleLbl name="fgAcc1">
+    <dgm:fillClrLst meth="repeat">
+      <a:schemeClr val="lt1">
+        <a:alpha val="90000"/>
+      </a:schemeClr>
+    </dgm:fillClrLst>
+    <dgm:linClrLst meth="repeat">
+      <a:schemeClr val="accent1"/>
+    </dgm:linClrLst>
+    <dgm:effectClrLst/>
+    <dgm:txLinClrLst/>
+    <dgm:txFillClrLst meth="repeat">
+      <a:schemeClr val="dk1"/>
+    </dgm:txFillClrLst>
+    <dgm:txEffectClrLst/>
+  </dgm:styleLbl>
+  <dgm:styleLbl name="conFgAcc1">
+    <dgm:fillClrLst meth="repeat">
+      <a:schemeClr val="lt1">
+        <a:alpha val="90000"/>
+      </a:schemeClr>
+    </dgm:fillClrLst>
+    <dgm:linClrLst meth="repeat">
+      <a:schemeClr val="accent1"/>
+    </dgm:linClrLst>
+    <dgm:effectClrLst/>
+    <dgm:txLinClrLst/>
+    <dgm:txFillClrLst meth="repeat">
+      <a:schemeClr val="dk1"/>
+    </dgm:txFillClrLst>
+    <dgm:txEffectClrLst/>
+  </dgm:styleLbl>
+  <dgm:styleLbl name="alignAcc1">
+    <dgm:fillClrLst meth="repeat">
+      <a:schemeClr val="lt1">
+        <a:alpha val="90000"/>
+      </a:schemeClr>
+    </dgm:fillClrLst>
+    <dgm:linClrLst meth="repeat">
+      <a:schemeClr val="accent1"/>
+    </dgm:linClrLst>
+    <dgm:effectClrLst/>
+    <dgm:txLinClrLst/>
+    <dgm:txFillClrLst meth="repeat">
+      <a:schemeClr val="dk1"/>
+    </dgm:txFillClrLst>
+    <dgm:txEffectClrLst/>
+  </dgm:styleLbl>
+  <dgm:styleLbl name="trAlignAcc1">
+    <dgm:fillClrLst meth="repeat">
+      <a:schemeClr val="lt1">
+        <a:alpha val="40000"/>
+      </a:schemeClr>
+    </dgm:fillClrLst>
+    <dgm:linClrLst meth="repeat">
+      <a:schemeClr val="accent1"/>
+    </dgm:linClrLst>
+    <dgm:effectClrLst/>
+    <dgm:txLinClrLst/>
+    <dgm:txFillClrLst meth="repeat">
+      <a:schemeClr val="dk1"/>
+    </dgm:txFillClrLst>
+    <dgm:txEffectClrLst/>
+  </dgm:styleLbl>
+  <dgm:styleLbl name="bgAcc1">
+    <dgm:fillClrLst meth="repeat">
+      <a:schemeClr val="lt1">
+        <a:alpha val="90000"/>
+      </a:schemeClr>
+    </dgm:fillClrLst>
+    <dgm:linClrLst meth="repeat">
+      <a:schemeClr val="accent1"/>
+    </dgm:linClrLst>
+    <dgm:effectClrLst/>
+    <dgm:txLinClrLst/>
+    <dgm:txFillClrLst meth="repeat">
+      <a:schemeClr val="dk1"/>
+    </dgm:txFillClrLst>
+    <dgm:txEffectClrLst/>
+  </dgm:styleLbl>
+  <dgm:styleLbl name="solidFgAcc1">
+    <dgm:fillClrLst meth="repeat">
+      <a:schemeClr val="lt1"/>
+    </dgm:fillClrLst>
+    <dgm:linClrLst meth="repeat">
+      <a:schemeClr val="accent1"/>
+    </dgm:linClrLst>
+    <dgm:effectClrLst/>
+    <dgm:txLinClrLst/>
+    <dgm:txFillClrLst meth="repeat">
+      <a:schemeClr val="dk1"/>
+    </dgm:txFillClrLst>
+    <dgm:txEffectClrLst/>
+  </dgm:styleLbl>
+  <dgm:styleLbl name="solidAlignAcc1">
+    <dgm:fillClrLst meth="repeat">
+      <a:schemeClr val="lt1"/>
+    </dgm:fillClrLst>
+    <dgm:linClrLst meth="repeat">
+      <a:schemeClr val="accent1"/>
+    </dgm:linClrLst>
+    <dgm:effectClrLst/>
+    <dgm:txLinClrLst/>
+    <dgm:txFillClrLst meth="repeat">
+      <a:schemeClr val="dk1"/>
+    </dgm:txFillClrLst>
+    <dgm:txEffectClrLst/>
+  </dgm:styleLbl>
+  <dgm:styleLbl name="solidBgAcc1">
+    <dgm:fillClrLst meth="repeat">
+      <a:schemeClr val="lt1"/>
+    </dgm:fillClrLst>
+    <dgm:linClrLst meth="repeat">
+      <a:schemeClr val="accent1"/>
+    </dgm:linClrLst>
+    <dgm:effectClrLst/>
+    <dgm:txLinClrLst/>
+    <dgm:txFillClrLst meth="repeat">
+      <a:schemeClr val="dk1"/>
+    </dgm:txFillClrLst>
+    <dgm:txEffectClrLst/>
+  </dgm:styleLbl>
+  <dgm:styleLbl name="fgAccFollowNode1">
+    <dgm:fillClrLst meth="repeat">
+      <a:schemeClr val="accent1">
+        <a:alpha val="90000"/>
+        <a:tint val="40000"/>
+      </a:schemeClr>
+    </dgm:fillClrLst>
+    <dgm:linClrLst meth="repeat">
+      <a:schemeClr val="accent1">
+        <a:alpha val="90000"/>
+        <a:tint val="40000"/>
+      </a:schemeClr>
+    </dgm:linClrLst>
+    <dgm:effectClrLst/>
+    <dgm:txLinClrLst/>
+    <dgm:txFillClrLst meth="repeat">
+      <a:schemeClr val="dk1"/>
+    </dgm:txFillClrLst>
+    <dgm:txEffectClrLst/>
+  </dgm:styleLbl>
+  <dgm:styleLbl name="alignAccFollowNode1">
+    <dgm:fillClrLst meth="repeat">
+      <a:schemeClr val="accent1">
+        <a:alpha val="90000"/>
+        <a:tint val="40000"/>
+      </a:schemeClr>
+    </dgm:fillClrLst>
+    <dgm:linClrLst meth="repeat">
+      <a:schemeClr val="accent1">
+        <a:alpha val="90000"/>
+        <a:tint val="40000"/>
+      </a:schemeClr>
+    </dgm:linClrLst>
+    <dgm:effectClrLst/>
+    <dgm:txLinClrLst/>
+    <dgm:txFillClrLst meth="repeat">
+      <a:schemeClr val="dk1"/>
+    </dgm:txFillClrLst>
+    <dgm:txEffectClrLst/>
+  </dgm:styleLbl>
+  <dgm:styleLbl name="bgAccFollowNode1">
+    <dgm:fillClrLst meth="repeat">
+      <a:schemeClr val="accent1">
+        <a:alpha val="90000"/>
+        <a:tint val="40000"/>
+      </a:schemeClr>
+    </dgm:fillClrLst>
+    <dgm:linClrLst meth="repeat">
+      <a:schemeClr val="accent1">
+        <a:alpha val="90000"/>
+        <a:tint val="40000"/>
+      </a:schemeClr>
+    </dgm:linClrLst>
+    <dgm:effectClrLst/>
+    <dgm:txLinClrLst/>
+    <dgm:txFillClrLst meth="repeat">
+      <a:schemeClr val="dk1"/>
+    </dgm:txFillClrLst>
+    <dgm:txEffectClrLst/>
+  </dgm:styleLbl>
+  <dgm:styleLbl name="fgAcc0">
+    <dgm:fillClrLst meth="repeat">
+      <a:schemeClr val="lt1">
+        <a:alpha val="90000"/>
+      </a:schemeClr>
+    </dgm:fillClrLst>
+    <dgm:linClrLst meth="repeat">
+      <a:schemeClr val="accent1"/>
+    </dgm:linClrLst>
+    <dgm:effectClrLst/>
+    <dgm:txLinClrLst/>
+    <dgm:txFillClrLst meth="repeat">
+      <a:schemeClr val="dk1"/>
+    </dgm:txFillClrLst>
+    <dgm:txEffectClrLst/>
+  </dgm:styleLbl>
+  <dgm:styleLbl name="fgAcc2">
+    <dgm:fillClrLst meth="repeat">
+      <a:schemeClr val="lt1">
+        <a:alpha val="90000"/>
+      </a:schemeClr>
+    </dgm:fillClrLst>
+    <dgm:linClrLst meth="repeat">
+      <a:schemeClr val="accent1"/>
+    </dgm:linClrLst>
+    <dgm:effectClrLst/>
+    <dgm:txLinClrLst/>
+    <dgm:txFillClrLst meth="repeat">
+      <a:schemeClr val="dk1"/>
+    </dgm:txFillClrLst>
+    <dgm:txEffectClrLst/>
+  </dgm:styleLbl>
+  <dgm:styleLbl name="fgAcc3">
+    <dgm:fillClrLst meth="repeat">
+      <a:schemeClr val="lt1">
+        <a:alpha val="90000"/>
+      </a:schemeClr>
+    </dgm:fillClrLst>
+    <dgm:linClrLst meth="repeat">
+      <a:schemeClr val="accent1"/>
+    </dgm:linClrLst>
+    <dgm:effectClrLst/>
+    <dgm:txLinClrLst/>
+    <dgm:txFillClrLst meth="repeat">
+      <a:schemeClr val="dk1"/>
+    </dgm:txFillClrLst>
+    <dgm:txEffectClrLst/>
+  </dgm:styleLbl>
+  <dgm:styleLbl name="fgAcc4">
+    <dgm:fillClrLst meth="repeat">
+      <a:schemeClr val="lt1">
+        <a:alpha val="90000"/>
+      </a:schemeClr>
+    </dgm:fillClrLst>
+    <dgm:linClrLst meth="repeat">
+      <a:schemeClr val="accent1"/>
+    </dgm:linClrLst>
+    <dgm:effectClrLst/>
+    <dgm:txLinClrLst/>
+    <dgm:txFillClrLst meth="repeat">
+      <a:schemeClr val="dk1"/>
+    </dgm:txFillClrLst>
+    <dgm:txEffectClrLst/>
+  </dgm:styleLbl>
+  <dgm:styleLbl name="bgShp">
+    <dgm:fillClrLst meth="repeat">
+      <a:schemeClr val="accent1">
+        <a:tint val="40000"/>
+      </a:schemeClr>
+    </dgm:fillClrLst>
+    <dgm:linClrLst meth="repeat">
+      <a:schemeClr val="accent1"/>
+    </dgm:linClrLst>
+    <dgm:effectClrLst/>
+    <dgm:txLinClrLst/>
+    <dgm:txFillClrLst meth="repeat">
+      <a:schemeClr val="dk1"/>
+    </dgm:txFillClrLst>
+    <dgm:txEffectClrLst/>
+  </dgm:styleLbl>
+  <dgm:styleLbl name="dkBgShp">
+    <dgm:fillClrLst meth="repeat">
+      <a:schemeClr val="accent1">
+        <a:shade val="80000"/>
+      </a:schemeClr>
+    </dgm:fillClrLst>
+    <dgm:linClrLst meth="repeat">
+      <a:schemeClr val="accent1"/>
+    </dgm:linClrLst>
+    <dgm:effectClrLst/>
+    <dgm:txLinClrLst/>
+    <dgm:txFillClrLst meth="repeat">
+      <a:schemeClr val="lt1"/>
+    </dgm:txFillClrLst>
+    <dgm:txEffectClrLst/>
+  </dgm:styleLbl>
+  <dgm:styleLbl name="trBgShp">
+    <dgm:fillClrLst meth="repeat">
+      <a:schemeClr val="accent1">
+        <a:tint val="50000"/>
+        <a:alpha val="40000"/>
+      </a:schemeClr>
+    </dgm:fillClrLst>
+    <dgm:linClrLst meth="repeat">
+      <a:schemeClr val="accent1"/>
+    </dgm:linClrLst>
+    <dgm:effectClrLst/>
+    <dgm:txLinClrLst/>
+    <dgm:txFillClrLst meth="repeat">
+      <a:schemeClr val="lt1"/>
+    </dgm:txFillClrLst>
+    <dgm:txEffectClrLst/>
+  </dgm:styleLbl>
+  <dgm:styleLbl name="fgShp">
+    <dgm:fillClrLst meth="repeat">
+      <a:schemeClr val="accent1">
+        <a:tint val="60000"/>
+      </a:schemeClr>
+    </dgm:fillClrLst>
+    <dgm:linClrLst meth="repeat">
+      <a:schemeClr val="lt1"/>
+    </dgm:linClrLst>
+    <dgm:effectClrLst/>
+    <dgm:txLinClrLst/>
+    <dgm:txFillClrLst meth="repeat">
+      <a:schemeClr val="dk1"/>
+    </dgm:txFillClrLst>
+    <dgm:txEffectClrLst/>
+  </dgm:styleLbl>
+  <dgm:styleLbl name="revTx">
+    <dgm:fillClrLst meth="repeat">
+      <a:schemeClr val="lt1">
+        <a:alpha val="0"/>
+      </a:schemeClr>
+    </dgm:fillClrLst>
+    <dgm:linClrLst meth="repeat">
+      <a:schemeClr val="dk1">
+        <a:alpha val="0"/>
+      </a:schemeClr>
+    </dgm:linClrLst>
+    <dgm:effectClrLst/>
+    <dgm:txLinClrLst/>
+    <dgm:txFillClrLst meth="repeat">
+      <a:schemeClr val="tx1"/>
+    </dgm:txFillClrLst>
+    <dgm:txEffectClrLst/>
+  </dgm:styleLbl>
+</dgm:colorsDef>
+</file>
+
+<file path=ppt/diagrams/colors2.xml><?xml version="1.0" encoding="utf-8"?>
 <dgm:colorsDef xmlns:dgm="http://schemas.openxmlformats.org/drawingml/2006/diagram" xmlns:a="http://schemas.openxmlformats.org/drawingml/2006/main" uniqueId="urn:microsoft.com/office/officeart/2005/8/colors/accent1_2">
   <dgm:title val=""/>
   <dgm:desc val=""/>
@@ -1676,6 +2425,466 @@
     <dgm:cxn modelId="{4D7476CE-7A9B-4C47-A415-9B015349323A}" type="presParOf" srcId="{C2220549-126C-8549-8459-392CAAAF1BEF}" destId="{DD8EB356-EDA0-8F4B-8667-DF95D1E0E46C}" srcOrd="4" destOrd="0" presId="urn:microsoft.com/office/officeart/2005/8/layout/lProcess3"/>
     <dgm:cxn modelId="{B5B84E38-0915-5849-80BC-B9B2BC9FA0D0}" type="presParOf" srcId="{C2220549-126C-8549-8459-392CAAAF1BEF}" destId="{819E668C-867F-1149-B257-688850EE3B56}" srcOrd="5" destOrd="0" presId="urn:microsoft.com/office/officeart/2005/8/layout/lProcess3"/>
     <dgm:cxn modelId="{E89BC95B-7573-4A4E-ADA4-B7FE9BB4894F}" type="presParOf" srcId="{C2220549-126C-8549-8459-392CAAAF1BEF}" destId="{0D10A498-F26E-784F-BCDF-DE1E9A194738}" srcOrd="6" destOrd="0" presId="urn:microsoft.com/office/officeart/2005/8/layout/lProcess3"/>
+  </dgm:cxnLst>
+  <dgm:bg/>
+  <dgm:whole/>
+  <dgm:extLst>
+    <a:ext uri="http://schemas.microsoft.com/office/drawing/2008/diagram">
+      <dsp:dataModelExt xmlns:dsp="http://schemas.microsoft.com/office/drawing/2008/diagram" relId="rId6" minVer="http://schemas.openxmlformats.org/drawingml/2006/diagram"/>
+    </a:ext>
+  </dgm:extLst>
+</dgm:dataModel>
+</file>
+
+<file path=ppt/diagrams/data2.xml><?xml version="1.0" encoding="utf-8"?>
+<dgm:dataModel xmlns:dgm="http://schemas.openxmlformats.org/drawingml/2006/diagram" xmlns:a="http://schemas.openxmlformats.org/drawingml/2006/main">
+  <dgm:ptLst>
+    <dgm:pt modelId="{DBF2FD6E-FB4E-A64B-B3A1-D95BF13B08C4}" type="doc">
+      <dgm:prSet loTypeId="urn:microsoft.com/office/officeart/2005/8/layout/hList6" loCatId="" qsTypeId="urn:microsoft.com/office/officeart/2005/8/quickstyle/simple1" qsCatId="simple" csTypeId="urn:microsoft.com/office/officeart/2005/8/colors/accent1_2" csCatId="accent1" phldr="1"/>
+      <dgm:spPr/>
+      <dgm:t>
+        <a:bodyPr/>
+        <a:lstStyle/>
+        <a:p>
+          <a:endParaRPr lang="en-US"/>
+        </a:p>
+      </dgm:t>
+    </dgm:pt>
+    <dgm:pt modelId="{7BB72947-2B30-1A41-81E3-A6C95DE77F44}">
+      <dgm:prSet phldrT="[Text]"/>
+      <dgm:spPr/>
+      <dgm:t>
+        <a:bodyPr/>
+        <a:lstStyle/>
+        <a:p>
+          <a:r>
+            <a:rPr lang="en-US" dirty="0"/>
+            <a:t>Basic</a:t>
+          </a:r>
+        </a:p>
+      </dgm:t>
+    </dgm:pt>
+    <dgm:pt modelId="{502AF4EA-2D7D-EB46-8759-91A2554CB2E4}" type="parTrans" cxnId="{E6A740E3-1C62-D14E-B12E-897D1B1C367C}">
+      <dgm:prSet/>
+      <dgm:spPr/>
+      <dgm:t>
+        <a:bodyPr/>
+        <a:lstStyle/>
+        <a:p>
+          <a:endParaRPr lang="en-US"/>
+        </a:p>
+      </dgm:t>
+    </dgm:pt>
+    <dgm:pt modelId="{93BB3592-8D19-904E-A083-645F9099A763}" type="sibTrans" cxnId="{E6A740E3-1C62-D14E-B12E-897D1B1C367C}">
+      <dgm:prSet/>
+      <dgm:spPr/>
+      <dgm:t>
+        <a:bodyPr/>
+        <a:lstStyle/>
+        <a:p>
+          <a:endParaRPr lang="en-US"/>
+        </a:p>
+      </dgm:t>
+    </dgm:pt>
+    <dgm:pt modelId="{F6C5874A-C023-424F-81D3-2740E6ECEA97}">
+      <dgm:prSet phldrT="[Text]" phldr="1"/>
+      <dgm:spPr/>
+      <dgm:t>
+        <a:bodyPr/>
+        <a:lstStyle/>
+        <a:p>
+          <a:endParaRPr lang="en-US"/>
+        </a:p>
+      </dgm:t>
+    </dgm:pt>
+    <dgm:pt modelId="{941E8558-46B2-114E-BD54-1AF123E0C984}" type="parTrans" cxnId="{821AFA37-9A2C-B143-8FB0-B25CC90FAE29}">
+      <dgm:prSet/>
+      <dgm:spPr/>
+      <dgm:t>
+        <a:bodyPr/>
+        <a:lstStyle/>
+        <a:p>
+          <a:endParaRPr lang="en-US"/>
+        </a:p>
+      </dgm:t>
+    </dgm:pt>
+    <dgm:pt modelId="{9FCA1A4E-286A-B34A-B9B6-7D3D8E2E04FE}" type="sibTrans" cxnId="{821AFA37-9A2C-B143-8FB0-B25CC90FAE29}">
+      <dgm:prSet/>
+      <dgm:spPr/>
+      <dgm:t>
+        <a:bodyPr/>
+        <a:lstStyle/>
+        <a:p>
+          <a:endParaRPr lang="en-US"/>
+        </a:p>
+      </dgm:t>
+    </dgm:pt>
+    <dgm:pt modelId="{A41524CB-6E99-3D45-9F39-56BECA844E4A}">
+      <dgm:prSet phldrT="[Text]" phldr="1"/>
+      <dgm:spPr/>
+      <dgm:t>
+        <a:bodyPr/>
+        <a:lstStyle/>
+        <a:p>
+          <a:endParaRPr lang="en-US"/>
+        </a:p>
+      </dgm:t>
+    </dgm:pt>
+    <dgm:pt modelId="{FF1B9025-47B5-FD4D-9E88-BA2ED9193D71}" type="parTrans" cxnId="{E4DC8281-A151-1B4A-9287-6A7E47B394C9}">
+      <dgm:prSet/>
+      <dgm:spPr/>
+      <dgm:t>
+        <a:bodyPr/>
+        <a:lstStyle/>
+        <a:p>
+          <a:endParaRPr lang="en-US"/>
+        </a:p>
+      </dgm:t>
+    </dgm:pt>
+    <dgm:pt modelId="{20725886-149F-A140-AF86-7AFEBBE8E9C0}" type="sibTrans" cxnId="{E4DC8281-A151-1B4A-9287-6A7E47B394C9}">
+      <dgm:prSet/>
+      <dgm:spPr/>
+      <dgm:t>
+        <a:bodyPr/>
+        <a:lstStyle/>
+        <a:p>
+          <a:endParaRPr lang="en-US"/>
+        </a:p>
+      </dgm:t>
+    </dgm:pt>
+    <dgm:pt modelId="{1D651B49-45AF-444F-A8DB-F1C707C4ED66}">
+      <dgm:prSet phldrT="[Text]"/>
+      <dgm:spPr/>
+      <dgm:t>
+        <a:bodyPr/>
+        <a:lstStyle/>
+        <a:p>
+          <a:r>
+            <a:rPr lang="en-US" dirty="0"/>
+            <a:t>Task</a:t>
+          </a:r>
+        </a:p>
+      </dgm:t>
+    </dgm:pt>
+    <dgm:pt modelId="{F00E12FA-3F85-9F49-B2C8-8D380613795A}" type="parTrans" cxnId="{546A5004-3E2F-B94C-90FF-2D609E2B55E8}">
+      <dgm:prSet/>
+      <dgm:spPr/>
+      <dgm:t>
+        <a:bodyPr/>
+        <a:lstStyle/>
+        <a:p>
+          <a:endParaRPr lang="en-US"/>
+        </a:p>
+      </dgm:t>
+    </dgm:pt>
+    <dgm:pt modelId="{84829FB9-F13F-D14D-9DD5-4157F1EC56A9}" type="sibTrans" cxnId="{546A5004-3E2F-B94C-90FF-2D609E2B55E8}">
+      <dgm:prSet/>
+      <dgm:spPr/>
+      <dgm:t>
+        <a:bodyPr/>
+        <a:lstStyle/>
+        <a:p>
+          <a:endParaRPr lang="en-US"/>
+        </a:p>
+      </dgm:t>
+    </dgm:pt>
+    <dgm:pt modelId="{AC37D35F-DC10-504A-8542-B21D41C0B726}">
+      <dgm:prSet phldrT="[Text]" phldr="1"/>
+      <dgm:spPr/>
+      <dgm:t>
+        <a:bodyPr/>
+        <a:lstStyle/>
+        <a:p>
+          <a:endParaRPr lang="en-US" dirty="0"/>
+        </a:p>
+      </dgm:t>
+    </dgm:pt>
+    <dgm:pt modelId="{41E8B2EF-7895-2D4B-897F-BE3830C01F51}" type="parTrans" cxnId="{F5A2C9B0-70E0-9142-9E8F-FB12CE8E75C9}">
+      <dgm:prSet/>
+      <dgm:spPr/>
+      <dgm:t>
+        <a:bodyPr/>
+        <a:lstStyle/>
+        <a:p>
+          <a:endParaRPr lang="en-US"/>
+        </a:p>
+      </dgm:t>
+    </dgm:pt>
+    <dgm:pt modelId="{8AF54FA2-D07F-CD42-9E44-F649AD79BE4C}" type="sibTrans" cxnId="{F5A2C9B0-70E0-9142-9E8F-FB12CE8E75C9}">
+      <dgm:prSet/>
+      <dgm:spPr/>
+      <dgm:t>
+        <a:bodyPr/>
+        <a:lstStyle/>
+        <a:p>
+          <a:endParaRPr lang="en-US"/>
+        </a:p>
+      </dgm:t>
+    </dgm:pt>
+    <dgm:pt modelId="{A1C18205-3AB5-6941-9869-6FACAEEF550A}">
+      <dgm:prSet phldrT="[Text]" phldr="1"/>
+      <dgm:spPr/>
+      <dgm:t>
+        <a:bodyPr/>
+        <a:lstStyle/>
+        <a:p>
+          <a:endParaRPr lang="en-US" dirty="0"/>
+        </a:p>
+      </dgm:t>
+    </dgm:pt>
+    <dgm:pt modelId="{3DA1CA3D-BEAB-094C-A130-F6FB9FFCC8FC}" type="parTrans" cxnId="{70B6D470-CC79-D84D-812D-5F15746E4244}">
+      <dgm:prSet/>
+      <dgm:spPr/>
+      <dgm:t>
+        <a:bodyPr/>
+        <a:lstStyle/>
+        <a:p>
+          <a:endParaRPr lang="en-US"/>
+        </a:p>
+      </dgm:t>
+    </dgm:pt>
+    <dgm:pt modelId="{CDCDC732-79FA-E942-AA8E-8FC7D846E5E6}" type="sibTrans" cxnId="{70B6D470-CC79-D84D-812D-5F15746E4244}">
+      <dgm:prSet/>
+      <dgm:spPr/>
+      <dgm:t>
+        <a:bodyPr/>
+        <a:lstStyle/>
+        <a:p>
+          <a:endParaRPr lang="en-US"/>
+        </a:p>
+      </dgm:t>
+    </dgm:pt>
+    <dgm:pt modelId="{BA853447-D8F5-594B-86A4-3CE7C3A3595C}">
+      <dgm:prSet phldrT="[Text]"/>
+      <dgm:spPr/>
+      <dgm:t>
+        <a:bodyPr/>
+        <a:lstStyle/>
+        <a:p>
+          <a:r>
+            <a:rPr lang="en-US" dirty="0"/>
+            <a:t>Research</a:t>
+          </a:r>
+        </a:p>
+      </dgm:t>
+    </dgm:pt>
+    <dgm:pt modelId="{E8C88A40-8BDC-9C42-9194-3EA70111CBF7}" type="parTrans" cxnId="{5F0CFC46-84EC-FB43-92FB-35E6858EB76B}">
+      <dgm:prSet/>
+      <dgm:spPr/>
+      <dgm:t>
+        <a:bodyPr/>
+        <a:lstStyle/>
+        <a:p>
+          <a:endParaRPr lang="en-US"/>
+        </a:p>
+      </dgm:t>
+    </dgm:pt>
+    <dgm:pt modelId="{503D7CF7-4836-6148-93A9-CDF7BAD85784}" type="sibTrans" cxnId="{5F0CFC46-84EC-FB43-92FB-35E6858EB76B}">
+      <dgm:prSet/>
+      <dgm:spPr/>
+      <dgm:t>
+        <a:bodyPr/>
+        <a:lstStyle/>
+        <a:p>
+          <a:endParaRPr lang="en-US"/>
+        </a:p>
+      </dgm:t>
+    </dgm:pt>
+    <dgm:pt modelId="{7E91CE92-9ACE-5A41-B21D-3F9D850321DA}">
+      <dgm:prSet phldrT="[Text]" phldr="1"/>
+      <dgm:spPr/>
+      <dgm:t>
+        <a:bodyPr/>
+        <a:lstStyle/>
+        <a:p>
+          <a:endParaRPr lang="en-US" dirty="0"/>
+        </a:p>
+      </dgm:t>
+    </dgm:pt>
+    <dgm:pt modelId="{2ECF98C5-4C6B-1B4C-AB4C-996C4F18F00B}" type="parTrans" cxnId="{8638FC9F-5B9E-5640-BEAA-0895D767D813}">
+      <dgm:prSet/>
+      <dgm:spPr/>
+      <dgm:t>
+        <a:bodyPr/>
+        <a:lstStyle/>
+        <a:p>
+          <a:endParaRPr lang="en-US"/>
+        </a:p>
+      </dgm:t>
+    </dgm:pt>
+    <dgm:pt modelId="{6E5A2154-0D08-CF4C-9EA9-63A24DFC5BF5}" type="sibTrans" cxnId="{8638FC9F-5B9E-5640-BEAA-0895D767D813}">
+      <dgm:prSet/>
+      <dgm:spPr/>
+      <dgm:t>
+        <a:bodyPr/>
+        <a:lstStyle/>
+        <a:p>
+          <a:endParaRPr lang="en-US"/>
+        </a:p>
+      </dgm:t>
+    </dgm:pt>
+    <dgm:pt modelId="{5FC7B9E7-1E48-294F-84F8-406B56E57321}">
+      <dgm:prSet phldrT="[Text]" phldr="1"/>
+      <dgm:spPr/>
+      <dgm:t>
+        <a:bodyPr/>
+        <a:lstStyle/>
+        <a:p>
+          <a:endParaRPr lang="en-US" dirty="0"/>
+        </a:p>
+      </dgm:t>
+    </dgm:pt>
+    <dgm:pt modelId="{44077F4A-A4EE-E541-B6F4-80727E1443ED}" type="parTrans" cxnId="{42C4724D-046F-7848-AF25-391661A3F9CB}">
+      <dgm:prSet/>
+      <dgm:spPr/>
+      <dgm:t>
+        <a:bodyPr/>
+        <a:lstStyle/>
+        <a:p>
+          <a:endParaRPr lang="en-US"/>
+        </a:p>
+      </dgm:t>
+    </dgm:pt>
+    <dgm:pt modelId="{BEDBA451-9BC4-074D-BADD-D407424918B9}" type="sibTrans" cxnId="{42C4724D-046F-7848-AF25-391661A3F9CB}">
+      <dgm:prSet/>
+      <dgm:spPr/>
+      <dgm:t>
+        <a:bodyPr/>
+        <a:lstStyle/>
+        <a:p>
+          <a:endParaRPr lang="en-US"/>
+        </a:p>
+      </dgm:t>
+    </dgm:pt>
+    <dgm:pt modelId="{E98DC232-EB1E-5F4E-A1CA-B086CDA5FC6C}">
+      <dgm:prSet phldrT="[Text]"/>
+      <dgm:spPr/>
+      <dgm:t>
+        <a:bodyPr/>
+        <a:lstStyle/>
+        <a:p>
+          <a:r>
+            <a:rPr lang="en-US" dirty="0"/>
+            <a:t>Universal</a:t>
+          </a:r>
+        </a:p>
+      </dgm:t>
+    </dgm:pt>
+    <dgm:pt modelId="{B13C342A-3E9F-AB46-A9CB-9D3FE4B5E9E2}" type="parTrans" cxnId="{EA9E6043-7C17-4E49-A803-7FC6E39DDBC5}">
+      <dgm:prSet/>
+      <dgm:spPr/>
+    </dgm:pt>
+    <dgm:pt modelId="{6752FF8E-CEB9-304C-9CC1-12B46B83E952}" type="sibTrans" cxnId="{EA9E6043-7C17-4E49-A803-7FC6E39DDBC5}">
+      <dgm:prSet/>
+      <dgm:spPr/>
+    </dgm:pt>
+    <dgm:pt modelId="{167DFC42-16DE-F448-BE24-04E7FE66666B}">
+      <dgm:prSet phldrT="[Text]"/>
+      <dgm:spPr/>
+      <dgm:t>
+        <a:bodyPr/>
+        <a:lstStyle/>
+        <a:p>
+          <a:r>
+            <a:rPr lang="en-US" dirty="0"/>
+            <a:t>Temporary</a:t>
+          </a:r>
+        </a:p>
+      </dgm:t>
+    </dgm:pt>
+    <dgm:pt modelId="{70BB528C-0D6B-9941-B1DF-F3325444484A}" type="parTrans" cxnId="{7C989009-E1AE-7442-BFE2-5AC60B568400}">
+      <dgm:prSet/>
+      <dgm:spPr/>
+    </dgm:pt>
+    <dgm:pt modelId="{83EA83DE-D172-8845-B0EA-7E3C322B5001}" type="sibTrans" cxnId="{7C989009-E1AE-7442-BFE2-5AC60B568400}">
+      <dgm:prSet/>
+      <dgm:spPr/>
+    </dgm:pt>
+    <dgm:pt modelId="{7BFAC217-010F-9347-B097-14440C39F64E}" type="pres">
+      <dgm:prSet presAssocID="{DBF2FD6E-FB4E-A64B-B3A1-D95BF13B08C4}" presName="Name0" presStyleCnt="0">
+        <dgm:presLayoutVars>
+          <dgm:dir/>
+          <dgm:resizeHandles val="exact"/>
+        </dgm:presLayoutVars>
+      </dgm:prSet>
+      <dgm:spPr/>
+    </dgm:pt>
+    <dgm:pt modelId="{D1B12023-0867-034E-B6CE-C9B463933580}" type="pres">
+      <dgm:prSet presAssocID="{7BB72947-2B30-1A41-81E3-A6C95DE77F44}" presName="node" presStyleLbl="node1" presStyleIdx="0" presStyleCnt="4">
+        <dgm:presLayoutVars>
+          <dgm:bulletEnabled val="1"/>
+        </dgm:presLayoutVars>
+      </dgm:prSet>
+      <dgm:spPr/>
+    </dgm:pt>
+    <dgm:pt modelId="{D475DCD6-8C50-8C45-B287-433FEF615039}" type="pres">
+      <dgm:prSet presAssocID="{93BB3592-8D19-904E-A083-645F9099A763}" presName="sibTrans" presStyleCnt="0"/>
+      <dgm:spPr/>
+    </dgm:pt>
+    <dgm:pt modelId="{1DE1FC4F-8110-F241-A764-523367B3D3C8}" type="pres">
+      <dgm:prSet presAssocID="{1D651B49-45AF-444F-A8DB-F1C707C4ED66}" presName="node" presStyleLbl="node1" presStyleIdx="1" presStyleCnt="4">
+        <dgm:presLayoutVars>
+          <dgm:bulletEnabled val="1"/>
+        </dgm:presLayoutVars>
+      </dgm:prSet>
+      <dgm:spPr/>
+    </dgm:pt>
+    <dgm:pt modelId="{7FE898BD-C2D4-554B-817D-1B1CC306A3E8}" type="pres">
+      <dgm:prSet presAssocID="{84829FB9-F13F-D14D-9DD5-4157F1EC56A9}" presName="sibTrans" presStyleCnt="0"/>
+      <dgm:spPr/>
+    </dgm:pt>
+    <dgm:pt modelId="{11719D39-6B7D-CE41-80ED-70443CB85040}" type="pres">
+      <dgm:prSet presAssocID="{BA853447-D8F5-594B-86A4-3CE7C3A3595C}" presName="node" presStyleLbl="node1" presStyleIdx="2" presStyleCnt="4">
+        <dgm:presLayoutVars>
+          <dgm:bulletEnabled val="1"/>
+        </dgm:presLayoutVars>
+      </dgm:prSet>
+      <dgm:spPr/>
+    </dgm:pt>
+    <dgm:pt modelId="{97D0D7F0-1308-0742-85DB-4E12914708CD}" type="pres">
+      <dgm:prSet presAssocID="{503D7CF7-4836-6148-93A9-CDF7BAD85784}" presName="sibTrans" presStyleCnt="0"/>
+      <dgm:spPr/>
+    </dgm:pt>
+    <dgm:pt modelId="{C147F232-4F16-3F47-9CE8-064460189D8C}" type="pres">
+      <dgm:prSet presAssocID="{E98DC232-EB1E-5F4E-A1CA-B086CDA5FC6C}" presName="node" presStyleLbl="node1" presStyleIdx="3" presStyleCnt="4">
+        <dgm:presLayoutVars>
+          <dgm:bulletEnabled val="1"/>
+        </dgm:presLayoutVars>
+      </dgm:prSet>
+      <dgm:spPr/>
+    </dgm:pt>
+  </dgm:ptLst>
+  <dgm:cxnLst>
+    <dgm:cxn modelId="{546A5004-3E2F-B94C-90FF-2D609E2B55E8}" srcId="{DBF2FD6E-FB4E-A64B-B3A1-D95BF13B08C4}" destId="{1D651B49-45AF-444F-A8DB-F1C707C4ED66}" srcOrd="1" destOrd="0" parTransId="{F00E12FA-3F85-9F49-B2C8-8D380613795A}" sibTransId="{84829FB9-F13F-D14D-9DD5-4157F1EC56A9}"/>
+    <dgm:cxn modelId="{7C989009-E1AE-7442-BFE2-5AC60B568400}" srcId="{E98DC232-EB1E-5F4E-A1CA-B086CDA5FC6C}" destId="{167DFC42-16DE-F448-BE24-04E7FE66666B}" srcOrd="0" destOrd="0" parTransId="{70BB528C-0D6B-9941-B1DF-F3325444484A}" sibTransId="{83EA83DE-D172-8845-B0EA-7E3C322B5001}"/>
+    <dgm:cxn modelId="{0622CE0E-8F82-3444-A6DE-3F0A5D632E0D}" type="presOf" srcId="{167DFC42-16DE-F448-BE24-04E7FE66666B}" destId="{C147F232-4F16-3F47-9CE8-064460189D8C}" srcOrd="0" destOrd="1" presId="urn:microsoft.com/office/officeart/2005/8/layout/hList6"/>
+    <dgm:cxn modelId="{1963051D-2FCD-0A4A-955A-DC7AA15B00A4}" type="presOf" srcId="{E98DC232-EB1E-5F4E-A1CA-B086CDA5FC6C}" destId="{C147F232-4F16-3F47-9CE8-064460189D8C}" srcOrd="0" destOrd="0" presId="urn:microsoft.com/office/officeart/2005/8/layout/hList6"/>
+    <dgm:cxn modelId="{821AFA37-9A2C-B143-8FB0-B25CC90FAE29}" srcId="{7BB72947-2B30-1A41-81E3-A6C95DE77F44}" destId="{F6C5874A-C023-424F-81D3-2740E6ECEA97}" srcOrd="0" destOrd="0" parTransId="{941E8558-46B2-114E-BD54-1AF123E0C984}" sibTransId="{9FCA1A4E-286A-B34A-B9B6-7D3D8E2E04FE}"/>
+    <dgm:cxn modelId="{EA9E6043-7C17-4E49-A803-7FC6E39DDBC5}" srcId="{DBF2FD6E-FB4E-A64B-B3A1-D95BF13B08C4}" destId="{E98DC232-EB1E-5F4E-A1CA-B086CDA5FC6C}" srcOrd="3" destOrd="0" parTransId="{B13C342A-3E9F-AB46-A9CB-9D3FE4B5E9E2}" sibTransId="{6752FF8E-CEB9-304C-9CC1-12B46B83E952}"/>
+    <dgm:cxn modelId="{5F0CFC46-84EC-FB43-92FB-35E6858EB76B}" srcId="{DBF2FD6E-FB4E-A64B-B3A1-D95BF13B08C4}" destId="{BA853447-D8F5-594B-86A4-3CE7C3A3595C}" srcOrd="2" destOrd="0" parTransId="{E8C88A40-8BDC-9C42-9194-3EA70111CBF7}" sibTransId="{503D7CF7-4836-6148-93A9-CDF7BAD85784}"/>
+    <dgm:cxn modelId="{4DA17148-522C-8E4E-995E-D1B752A59B95}" type="presOf" srcId="{DBF2FD6E-FB4E-A64B-B3A1-D95BF13B08C4}" destId="{7BFAC217-010F-9347-B097-14440C39F64E}" srcOrd="0" destOrd="0" presId="urn:microsoft.com/office/officeart/2005/8/layout/hList6"/>
+    <dgm:cxn modelId="{42C4724D-046F-7848-AF25-391661A3F9CB}" srcId="{BA853447-D8F5-594B-86A4-3CE7C3A3595C}" destId="{5FC7B9E7-1E48-294F-84F8-406B56E57321}" srcOrd="1" destOrd="0" parTransId="{44077F4A-A4EE-E541-B6F4-80727E1443ED}" sibTransId="{BEDBA451-9BC4-074D-BADD-D407424918B9}"/>
+    <dgm:cxn modelId="{0FA81A57-3394-6E45-8619-27CB162E65E6}" type="presOf" srcId="{7BB72947-2B30-1A41-81E3-A6C95DE77F44}" destId="{D1B12023-0867-034E-B6CE-C9B463933580}" srcOrd="0" destOrd="0" presId="urn:microsoft.com/office/officeart/2005/8/layout/hList6"/>
+    <dgm:cxn modelId="{A18B745D-BD04-D049-8061-4BBB99A99072}" type="presOf" srcId="{1D651B49-45AF-444F-A8DB-F1C707C4ED66}" destId="{1DE1FC4F-8110-F241-A764-523367B3D3C8}" srcOrd="0" destOrd="0" presId="urn:microsoft.com/office/officeart/2005/8/layout/hList6"/>
+    <dgm:cxn modelId="{70B6D470-CC79-D84D-812D-5F15746E4244}" srcId="{1D651B49-45AF-444F-A8DB-F1C707C4ED66}" destId="{A1C18205-3AB5-6941-9869-6FACAEEF550A}" srcOrd="1" destOrd="0" parTransId="{3DA1CA3D-BEAB-094C-A130-F6FB9FFCC8FC}" sibTransId="{CDCDC732-79FA-E942-AA8E-8FC7D846E5E6}"/>
+    <dgm:cxn modelId="{E4DC8281-A151-1B4A-9287-6A7E47B394C9}" srcId="{7BB72947-2B30-1A41-81E3-A6C95DE77F44}" destId="{A41524CB-6E99-3D45-9F39-56BECA844E4A}" srcOrd="1" destOrd="0" parTransId="{FF1B9025-47B5-FD4D-9E88-BA2ED9193D71}" sibTransId="{20725886-149F-A140-AF86-7AFEBBE8E9C0}"/>
+    <dgm:cxn modelId="{9F8E7F8E-8B96-E34A-8F64-A46E014DD597}" type="presOf" srcId="{5FC7B9E7-1E48-294F-84F8-406B56E57321}" destId="{11719D39-6B7D-CE41-80ED-70443CB85040}" srcOrd="0" destOrd="2" presId="urn:microsoft.com/office/officeart/2005/8/layout/hList6"/>
+    <dgm:cxn modelId="{2CFCF09B-A474-F54D-A75D-0BD22C7C315B}" type="presOf" srcId="{F6C5874A-C023-424F-81D3-2740E6ECEA97}" destId="{D1B12023-0867-034E-B6CE-C9B463933580}" srcOrd="0" destOrd="1" presId="urn:microsoft.com/office/officeart/2005/8/layout/hList6"/>
+    <dgm:cxn modelId="{2BEC119F-7182-9744-A867-3F1CAD34068E}" type="presOf" srcId="{AC37D35F-DC10-504A-8542-B21D41C0B726}" destId="{1DE1FC4F-8110-F241-A764-523367B3D3C8}" srcOrd="0" destOrd="1" presId="urn:microsoft.com/office/officeart/2005/8/layout/hList6"/>
+    <dgm:cxn modelId="{8638FC9F-5B9E-5640-BEAA-0895D767D813}" srcId="{BA853447-D8F5-594B-86A4-3CE7C3A3595C}" destId="{7E91CE92-9ACE-5A41-B21D-3F9D850321DA}" srcOrd="0" destOrd="0" parTransId="{2ECF98C5-4C6B-1B4C-AB4C-996C4F18F00B}" sibTransId="{6E5A2154-0D08-CF4C-9EA9-63A24DFC5BF5}"/>
+    <dgm:cxn modelId="{F5A2C9B0-70E0-9142-9E8F-FB12CE8E75C9}" srcId="{1D651B49-45AF-444F-A8DB-F1C707C4ED66}" destId="{AC37D35F-DC10-504A-8542-B21D41C0B726}" srcOrd="0" destOrd="0" parTransId="{41E8B2EF-7895-2D4B-897F-BE3830C01F51}" sibTransId="{8AF54FA2-D07F-CD42-9E44-F649AD79BE4C}"/>
+    <dgm:cxn modelId="{86DBE0BF-FC4B-3E4E-BB5F-3AA2FFCE56DD}" type="presOf" srcId="{A1C18205-3AB5-6941-9869-6FACAEEF550A}" destId="{1DE1FC4F-8110-F241-A764-523367B3D3C8}" srcOrd="0" destOrd="2" presId="urn:microsoft.com/office/officeart/2005/8/layout/hList6"/>
+    <dgm:cxn modelId="{74D497D9-2A79-C340-895E-31A32F612AC6}" type="presOf" srcId="{BA853447-D8F5-594B-86A4-3CE7C3A3595C}" destId="{11719D39-6B7D-CE41-80ED-70443CB85040}" srcOrd="0" destOrd="0" presId="urn:microsoft.com/office/officeart/2005/8/layout/hList6"/>
+    <dgm:cxn modelId="{E6A740E3-1C62-D14E-B12E-897D1B1C367C}" srcId="{DBF2FD6E-FB4E-A64B-B3A1-D95BF13B08C4}" destId="{7BB72947-2B30-1A41-81E3-A6C95DE77F44}" srcOrd="0" destOrd="0" parTransId="{502AF4EA-2D7D-EB46-8759-91A2554CB2E4}" sibTransId="{93BB3592-8D19-904E-A083-645F9099A763}"/>
+    <dgm:cxn modelId="{A5D2FAEB-DB0C-9C4E-AC70-34AAC409FD72}" type="presOf" srcId="{A41524CB-6E99-3D45-9F39-56BECA844E4A}" destId="{D1B12023-0867-034E-B6CE-C9B463933580}" srcOrd="0" destOrd="2" presId="urn:microsoft.com/office/officeart/2005/8/layout/hList6"/>
+    <dgm:cxn modelId="{2F13C9F8-8624-254C-BA11-F3D1614A3853}" type="presOf" srcId="{7E91CE92-9ACE-5A41-B21D-3F9D850321DA}" destId="{11719D39-6B7D-CE41-80ED-70443CB85040}" srcOrd="0" destOrd="1" presId="urn:microsoft.com/office/officeart/2005/8/layout/hList6"/>
+    <dgm:cxn modelId="{0572F4DB-36F4-DB42-95F5-21E794FB9045}" type="presParOf" srcId="{7BFAC217-010F-9347-B097-14440C39F64E}" destId="{D1B12023-0867-034E-B6CE-C9B463933580}" srcOrd="0" destOrd="0" presId="urn:microsoft.com/office/officeart/2005/8/layout/hList6"/>
+    <dgm:cxn modelId="{2B74638F-030B-154C-9421-F3365CF682E3}" type="presParOf" srcId="{7BFAC217-010F-9347-B097-14440C39F64E}" destId="{D475DCD6-8C50-8C45-B287-433FEF615039}" srcOrd="1" destOrd="0" presId="urn:microsoft.com/office/officeart/2005/8/layout/hList6"/>
+    <dgm:cxn modelId="{DE1321AD-BE71-B045-9AA9-9641C1CEC165}" type="presParOf" srcId="{7BFAC217-010F-9347-B097-14440C39F64E}" destId="{1DE1FC4F-8110-F241-A764-523367B3D3C8}" srcOrd="2" destOrd="0" presId="urn:microsoft.com/office/officeart/2005/8/layout/hList6"/>
+    <dgm:cxn modelId="{56E71323-3A50-AD41-A6E4-149C1A8F3194}" type="presParOf" srcId="{7BFAC217-010F-9347-B097-14440C39F64E}" destId="{7FE898BD-C2D4-554B-817D-1B1CC306A3E8}" srcOrd="3" destOrd="0" presId="urn:microsoft.com/office/officeart/2005/8/layout/hList6"/>
+    <dgm:cxn modelId="{5B55618B-11CF-D741-BD4D-5F138C88A318}" type="presParOf" srcId="{7BFAC217-010F-9347-B097-14440C39F64E}" destId="{11719D39-6B7D-CE41-80ED-70443CB85040}" srcOrd="4" destOrd="0" presId="urn:microsoft.com/office/officeart/2005/8/layout/hList6"/>
+    <dgm:cxn modelId="{C26CCF70-2134-6241-9041-7899F2D31357}" type="presParOf" srcId="{7BFAC217-010F-9347-B097-14440C39F64E}" destId="{97D0D7F0-1308-0742-85DB-4E12914708CD}" srcOrd="5" destOrd="0" presId="urn:microsoft.com/office/officeart/2005/8/layout/hList6"/>
+    <dgm:cxn modelId="{59E3AEB5-4806-604F-A39F-ED92FC84C60F}" type="presParOf" srcId="{7BFAC217-010F-9347-B097-14440C39F64E}" destId="{C147F232-4F16-3F47-9CE8-064460189D8C}" srcOrd="6" destOrd="0" presId="urn:microsoft.com/office/officeart/2005/8/layout/hList6"/>
   </dgm:cxnLst>
   <dgm:bg/>
   <dgm:whole/>
@@ -2876,6 +4085,434 @@
 </dsp:drawing>
 </file>
 
+<file path=ppt/diagrams/drawing2.xml><?xml version="1.0" encoding="utf-8"?>
+<dsp:drawing xmlns:dgm="http://schemas.openxmlformats.org/drawingml/2006/diagram" xmlns:dsp="http://schemas.microsoft.com/office/drawing/2008/diagram" xmlns:a="http://schemas.openxmlformats.org/drawingml/2006/main">
+  <dsp:spTree>
+    <dsp:nvGrpSpPr>
+      <dsp:cNvPr id="0" name=""/>
+      <dsp:cNvGrpSpPr/>
+    </dsp:nvGrpSpPr>
+    <dsp:grpSpPr/>
+    <dsp:sp modelId="{D1B12023-0867-034E-B6CE-C9B463933580}">
+      <dsp:nvSpPr>
+        <dsp:cNvPr id="0" name=""/>
+        <dsp:cNvSpPr/>
+      </dsp:nvSpPr>
+      <dsp:spPr>
+        <a:xfrm rot="16200000">
+          <a:off x="-623981" y="626423"/>
+          <a:ext cx="3649662" cy="2396814"/>
+        </a:xfrm>
+        <a:prstGeom prst="flowChartManualOperation">
+          <a:avLst/>
+        </a:prstGeom>
+        <a:solidFill>
+          <a:schemeClr val="accent1">
+            <a:hueOff val="0"/>
+            <a:satOff val="0"/>
+            <a:lumOff val="0"/>
+            <a:alphaOff val="0"/>
+          </a:schemeClr>
+        </a:solidFill>
+        <a:ln w="19050" cap="rnd" cmpd="sng" algn="ctr">
+          <a:solidFill>
+            <a:schemeClr val="lt1">
+              <a:hueOff val="0"/>
+              <a:satOff val="0"/>
+              <a:lumOff val="0"/>
+              <a:alphaOff val="0"/>
+            </a:schemeClr>
+          </a:solidFill>
+          <a:prstDash val="solid"/>
+        </a:ln>
+        <a:effectLst/>
+      </dsp:spPr>
+      <dsp:style>
+        <a:lnRef idx="2">
+          <a:scrgbClr r="0" g="0" b="0"/>
+        </a:lnRef>
+        <a:fillRef idx="1">
+          <a:scrgbClr r="0" g="0" b="0"/>
+        </a:fillRef>
+        <a:effectRef idx="0">
+          <a:scrgbClr r="0" g="0" b="0"/>
+        </a:effectRef>
+        <a:fontRef idx="minor">
+          <a:schemeClr val="lt1"/>
+        </a:fontRef>
+      </dsp:style>
+      <dsp:txBody>
+        <a:bodyPr spcFirstLastPara="0" vert="horz" wrap="square" lIns="234950" tIns="0" rIns="237551" bIns="0" numCol="1" spcCol="1270" anchor="t" anchorCtr="0">
+          <a:noAutofit/>
+        </a:bodyPr>
+        <a:lstStyle/>
+        <a:p>
+          <a:pPr marL="0" lvl="0" indent="0" algn="l" defTabSz="1644650">
+            <a:lnSpc>
+              <a:spcPct val="90000"/>
+            </a:lnSpc>
+            <a:spcBef>
+              <a:spcPct val="0"/>
+            </a:spcBef>
+            <a:spcAft>
+              <a:spcPct val="35000"/>
+            </a:spcAft>
+            <a:buNone/>
+          </a:pPr>
+          <a:r>
+            <a:rPr lang="en-US" sz="3700" kern="1200" dirty="0"/>
+            <a:t>Basic</a:t>
+          </a:r>
+        </a:p>
+        <a:p>
+          <a:pPr marL="285750" lvl="1" indent="-285750" algn="l" defTabSz="1289050">
+            <a:lnSpc>
+              <a:spcPct val="90000"/>
+            </a:lnSpc>
+            <a:spcBef>
+              <a:spcPct val="0"/>
+            </a:spcBef>
+            <a:spcAft>
+              <a:spcPct val="15000"/>
+            </a:spcAft>
+            <a:buChar char="•"/>
+          </a:pPr>
+          <a:endParaRPr lang="en-US" sz="2900" kern="1200"/>
+        </a:p>
+        <a:p>
+          <a:pPr marL="285750" lvl="1" indent="-285750" algn="l" defTabSz="1289050">
+            <a:lnSpc>
+              <a:spcPct val="90000"/>
+            </a:lnSpc>
+            <a:spcBef>
+              <a:spcPct val="0"/>
+            </a:spcBef>
+            <a:spcAft>
+              <a:spcPct val="15000"/>
+            </a:spcAft>
+            <a:buChar char="•"/>
+          </a:pPr>
+          <a:endParaRPr lang="en-US" sz="2900" kern="1200"/>
+        </a:p>
+      </dsp:txBody>
+      <dsp:txXfrm rot="5400000">
+        <a:off x="2443" y="729931"/>
+        <a:ext cx="2396814" cy="2189798"/>
+      </dsp:txXfrm>
+    </dsp:sp>
+    <dsp:sp modelId="{1DE1FC4F-8110-F241-A764-523367B3D3C8}">
+      <dsp:nvSpPr>
+        <dsp:cNvPr id="0" name=""/>
+        <dsp:cNvSpPr/>
+      </dsp:nvSpPr>
+      <dsp:spPr>
+        <a:xfrm rot="16200000">
+          <a:off x="1952593" y="626423"/>
+          <a:ext cx="3649662" cy="2396814"/>
+        </a:xfrm>
+        <a:prstGeom prst="flowChartManualOperation">
+          <a:avLst/>
+        </a:prstGeom>
+        <a:solidFill>
+          <a:schemeClr val="accent1">
+            <a:hueOff val="0"/>
+            <a:satOff val="0"/>
+            <a:lumOff val="0"/>
+            <a:alphaOff val="0"/>
+          </a:schemeClr>
+        </a:solidFill>
+        <a:ln w="19050" cap="rnd" cmpd="sng" algn="ctr">
+          <a:solidFill>
+            <a:schemeClr val="lt1">
+              <a:hueOff val="0"/>
+              <a:satOff val="0"/>
+              <a:lumOff val="0"/>
+              <a:alphaOff val="0"/>
+            </a:schemeClr>
+          </a:solidFill>
+          <a:prstDash val="solid"/>
+        </a:ln>
+        <a:effectLst/>
+      </dsp:spPr>
+      <dsp:style>
+        <a:lnRef idx="2">
+          <a:scrgbClr r="0" g="0" b="0"/>
+        </a:lnRef>
+        <a:fillRef idx="1">
+          <a:scrgbClr r="0" g="0" b="0"/>
+        </a:fillRef>
+        <a:effectRef idx="0">
+          <a:scrgbClr r="0" g="0" b="0"/>
+        </a:effectRef>
+        <a:fontRef idx="minor">
+          <a:schemeClr val="lt1"/>
+        </a:fontRef>
+      </dsp:style>
+      <dsp:txBody>
+        <a:bodyPr spcFirstLastPara="0" vert="horz" wrap="square" lIns="234950" tIns="0" rIns="237551" bIns="0" numCol="1" spcCol="1270" anchor="t" anchorCtr="0">
+          <a:noAutofit/>
+        </a:bodyPr>
+        <a:lstStyle/>
+        <a:p>
+          <a:pPr marL="0" lvl="0" indent="0" algn="l" defTabSz="1644650">
+            <a:lnSpc>
+              <a:spcPct val="90000"/>
+            </a:lnSpc>
+            <a:spcBef>
+              <a:spcPct val="0"/>
+            </a:spcBef>
+            <a:spcAft>
+              <a:spcPct val="35000"/>
+            </a:spcAft>
+            <a:buNone/>
+          </a:pPr>
+          <a:r>
+            <a:rPr lang="en-US" sz="3700" kern="1200" dirty="0"/>
+            <a:t>Task</a:t>
+          </a:r>
+        </a:p>
+        <a:p>
+          <a:pPr marL="285750" lvl="1" indent="-285750" algn="l" defTabSz="1289050">
+            <a:lnSpc>
+              <a:spcPct val="90000"/>
+            </a:lnSpc>
+            <a:spcBef>
+              <a:spcPct val="0"/>
+            </a:spcBef>
+            <a:spcAft>
+              <a:spcPct val="15000"/>
+            </a:spcAft>
+            <a:buChar char="•"/>
+          </a:pPr>
+          <a:endParaRPr lang="en-US" sz="2900" kern="1200"/>
+        </a:p>
+        <a:p>
+          <a:pPr marL="285750" lvl="1" indent="-285750" algn="l" defTabSz="1289050">
+            <a:lnSpc>
+              <a:spcPct val="90000"/>
+            </a:lnSpc>
+            <a:spcBef>
+              <a:spcPct val="0"/>
+            </a:spcBef>
+            <a:spcAft>
+              <a:spcPct val="15000"/>
+            </a:spcAft>
+            <a:buChar char="•"/>
+          </a:pPr>
+          <a:endParaRPr lang="en-US" sz="2900" kern="1200"/>
+        </a:p>
+      </dsp:txBody>
+      <dsp:txXfrm rot="5400000">
+        <a:off x="2579017" y="729931"/>
+        <a:ext cx="2396814" cy="2189798"/>
+      </dsp:txXfrm>
+    </dsp:sp>
+    <dsp:sp modelId="{11719D39-6B7D-CE41-80ED-70443CB85040}">
+      <dsp:nvSpPr>
+        <dsp:cNvPr id="0" name=""/>
+        <dsp:cNvSpPr/>
+      </dsp:nvSpPr>
+      <dsp:spPr>
+        <a:xfrm rot="16200000">
+          <a:off x="4529169" y="626423"/>
+          <a:ext cx="3649662" cy="2396814"/>
+        </a:xfrm>
+        <a:prstGeom prst="flowChartManualOperation">
+          <a:avLst/>
+        </a:prstGeom>
+        <a:solidFill>
+          <a:schemeClr val="accent1">
+            <a:hueOff val="0"/>
+            <a:satOff val="0"/>
+            <a:lumOff val="0"/>
+            <a:alphaOff val="0"/>
+          </a:schemeClr>
+        </a:solidFill>
+        <a:ln w="19050" cap="rnd" cmpd="sng" algn="ctr">
+          <a:solidFill>
+            <a:schemeClr val="lt1">
+              <a:hueOff val="0"/>
+              <a:satOff val="0"/>
+              <a:lumOff val="0"/>
+              <a:alphaOff val="0"/>
+            </a:schemeClr>
+          </a:solidFill>
+          <a:prstDash val="solid"/>
+        </a:ln>
+        <a:effectLst/>
+      </dsp:spPr>
+      <dsp:style>
+        <a:lnRef idx="2">
+          <a:scrgbClr r="0" g="0" b="0"/>
+        </a:lnRef>
+        <a:fillRef idx="1">
+          <a:scrgbClr r="0" g="0" b="0"/>
+        </a:fillRef>
+        <a:effectRef idx="0">
+          <a:scrgbClr r="0" g="0" b="0"/>
+        </a:effectRef>
+        <a:fontRef idx="minor">
+          <a:schemeClr val="lt1"/>
+        </a:fontRef>
+      </dsp:style>
+      <dsp:txBody>
+        <a:bodyPr spcFirstLastPara="0" vert="horz" wrap="square" lIns="234950" tIns="0" rIns="237551" bIns="0" numCol="1" spcCol="1270" anchor="t" anchorCtr="0">
+          <a:noAutofit/>
+        </a:bodyPr>
+        <a:lstStyle/>
+        <a:p>
+          <a:pPr marL="0" lvl="0" indent="0" algn="l" defTabSz="1644650">
+            <a:lnSpc>
+              <a:spcPct val="90000"/>
+            </a:lnSpc>
+            <a:spcBef>
+              <a:spcPct val="0"/>
+            </a:spcBef>
+            <a:spcAft>
+              <a:spcPct val="35000"/>
+            </a:spcAft>
+            <a:buNone/>
+          </a:pPr>
+          <a:r>
+            <a:rPr lang="en-US" sz="3700" kern="1200" dirty="0"/>
+            <a:t>Research</a:t>
+          </a:r>
+        </a:p>
+        <a:p>
+          <a:pPr marL="285750" lvl="1" indent="-285750" algn="l" defTabSz="1289050">
+            <a:lnSpc>
+              <a:spcPct val="90000"/>
+            </a:lnSpc>
+            <a:spcBef>
+              <a:spcPct val="0"/>
+            </a:spcBef>
+            <a:spcAft>
+              <a:spcPct val="15000"/>
+            </a:spcAft>
+            <a:buChar char="•"/>
+          </a:pPr>
+          <a:endParaRPr lang="en-US" sz="2900" kern="1200" dirty="0"/>
+        </a:p>
+        <a:p>
+          <a:pPr marL="285750" lvl="1" indent="-285750" algn="l" defTabSz="1289050">
+            <a:lnSpc>
+              <a:spcPct val="90000"/>
+            </a:lnSpc>
+            <a:spcBef>
+              <a:spcPct val="0"/>
+            </a:spcBef>
+            <a:spcAft>
+              <a:spcPct val="15000"/>
+            </a:spcAft>
+            <a:buChar char="•"/>
+          </a:pPr>
+          <a:endParaRPr lang="en-US" sz="2900" kern="1200" dirty="0"/>
+        </a:p>
+      </dsp:txBody>
+      <dsp:txXfrm rot="5400000">
+        <a:off x="5155593" y="729931"/>
+        <a:ext cx="2396814" cy="2189798"/>
+      </dsp:txXfrm>
+    </dsp:sp>
+    <dsp:sp modelId="{C147F232-4F16-3F47-9CE8-064460189D8C}">
+      <dsp:nvSpPr>
+        <dsp:cNvPr id="0" name=""/>
+        <dsp:cNvSpPr/>
+      </dsp:nvSpPr>
+      <dsp:spPr>
+        <a:xfrm rot="16200000">
+          <a:off x="7105744" y="626423"/>
+          <a:ext cx="3649662" cy="2396814"/>
+        </a:xfrm>
+        <a:prstGeom prst="flowChartManualOperation">
+          <a:avLst/>
+        </a:prstGeom>
+        <a:solidFill>
+          <a:schemeClr val="accent1">
+            <a:hueOff val="0"/>
+            <a:satOff val="0"/>
+            <a:lumOff val="0"/>
+            <a:alphaOff val="0"/>
+          </a:schemeClr>
+        </a:solidFill>
+        <a:ln w="19050" cap="rnd" cmpd="sng" algn="ctr">
+          <a:solidFill>
+            <a:schemeClr val="lt1">
+              <a:hueOff val="0"/>
+              <a:satOff val="0"/>
+              <a:lumOff val="0"/>
+              <a:alphaOff val="0"/>
+            </a:schemeClr>
+          </a:solidFill>
+          <a:prstDash val="solid"/>
+        </a:ln>
+        <a:effectLst/>
+      </dsp:spPr>
+      <dsp:style>
+        <a:lnRef idx="2">
+          <a:scrgbClr r="0" g="0" b="0"/>
+        </a:lnRef>
+        <a:fillRef idx="1">
+          <a:scrgbClr r="0" g="0" b="0"/>
+        </a:fillRef>
+        <a:effectRef idx="0">
+          <a:scrgbClr r="0" g="0" b="0"/>
+        </a:effectRef>
+        <a:fontRef idx="minor">
+          <a:schemeClr val="lt1"/>
+        </a:fontRef>
+      </dsp:style>
+      <dsp:txBody>
+        <a:bodyPr spcFirstLastPara="0" vert="horz" wrap="square" lIns="234950" tIns="0" rIns="237551" bIns="0" numCol="1" spcCol="1270" anchor="t" anchorCtr="0">
+          <a:noAutofit/>
+        </a:bodyPr>
+        <a:lstStyle/>
+        <a:p>
+          <a:pPr marL="0" lvl="0" indent="0" algn="l" defTabSz="1644650">
+            <a:lnSpc>
+              <a:spcPct val="90000"/>
+            </a:lnSpc>
+            <a:spcBef>
+              <a:spcPct val="0"/>
+            </a:spcBef>
+            <a:spcAft>
+              <a:spcPct val="35000"/>
+            </a:spcAft>
+            <a:buNone/>
+          </a:pPr>
+          <a:r>
+            <a:rPr lang="en-US" sz="3700" kern="1200" dirty="0"/>
+            <a:t>Universal</a:t>
+          </a:r>
+        </a:p>
+        <a:p>
+          <a:pPr marL="285750" lvl="1" indent="-285750" algn="l" defTabSz="1289050">
+            <a:lnSpc>
+              <a:spcPct val="90000"/>
+            </a:lnSpc>
+            <a:spcBef>
+              <a:spcPct val="0"/>
+            </a:spcBef>
+            <a:spcAft>
+              <a:spcPct val="15000"/>
+            </a:spcAft>
+            <a:buChar char="•"/>
+          </a:pPr>
+          <a:r>
+            <a:rPr lang="en-US" sz="2900" kern="1200" dirty="0"/>
+            <a:t>Temporary</a:t>
+          </a:r>
+        </a:p>
+      </dsp:txBody>
+      <dsp:txXfrm rot="5400000">
+        <a:off x="7732168" y="729931"/>
+        <a:ext cx="2396814" cy="2189798"/>
+      </dsp:txXfrm>
+    </dsp:sp>
+  </dsp:spTree>
+</dsp:drawing>
+</file>
+
 <file path=ppt/diagrams/layout1.xml><?xml version="1.0" encoding="utf-8"?>
 <dgm:layoutDef xmlns:dgm="http://schemas.openxmlformats.org/drawingml/2006/diagram" xmlns:a="http://schemas.openxmlformats.org/drawingml/2006/main" uniqueId="urn:microsoft.com/office/officeart/2005/8/layout/lProcess3">
   <dgm:title val=""/>
@@ -3157,7 +4794,1213 @@
 </dgm:layoutDef>
 </file>
 
+<file path=ppt/diagrams/layout2.xml><?xml version="1.0" encoding="utf-8"?>
+<dgm:layoutDef xmlns:dgm="http://schemas.openxmlformats.org/drawingml/2006/diagram" xmlns:a="http://schemas.openxmlformats.org/drawingml/2006/main" uniqueId="urn:microsoft.com/office/officeart/2005/8/layout/hList6">
+  <dgm:title val=""/>
+  <dgm:desc val=""/>
+  <dgm:catLst>
+    <dgm:cat type="list" pri="18000"/>
+  </dgm:catLst>
+  <dgm:sampData>
+    <dgm:dataModel>
+      <dgm:ptLst>
+        <dgm:pt modelId="0" type="doc"/>
+        <dgm:pt modelId="1">
+          <dgm:prSet phldr="1"/>
+        </dgm:pt>
+        <dgm:pt modelId="11">
+          <dgm:prSet phldr="1"/>
+        </dgm:pt>
+        <dgm:pt modelId="12">
+          <dgm:prSet phldr="1"/>
+        </dgm:pt>
+        <dgm:pt modelId="2">
+          <dgm:prSet phldr="1"/>
+        </dgm:pt>
+        <dgm:pt modelId="21">
+          <dgm:prSet phldr="1"/>
+        </dgm:pt>
+        <dgm:pt modelId="22">
+          <dgm:prSet phldr="1"/>
+        </dgm:pt>
+        <dgm:pt modelId="3">
+          <dgm:prSet phldr="1"/>
+        </dgm:pt>
+        <dgm:pt modelId="31">
+          <dgm:prSet phldr="1"/>
+        </dgm:pt>
+        <dgm:pt modelId="32">
+          <dgm:prSet phldr="1"/>
+        </dgm:pt>
+      </dgm:ptLst>
+      <dgm:cxnLst>
+        <dgm:cxn modelId="4" srcId="0" destId="1" srcOrd="0" destOrd="0"/>
+        <dgm:cxn modelId="5" srcId="0" destId="2" srcOrd="1" destOrd="0"/>
+        <dgm:cxn modelId="6" srcId="0" destId="3" srcOrd="2" destOrd="0"/>
+        <dgm:cxn modelId="13" srcId="1" destId="11" srcOrd="0" destOrd="0"/>
+        <dgm:cxn modelId="14" srcId="1" destId="12" srcOrd="1" destOrd="0"/>
+        <dgm:cxn modelId="23" srcId="2" destId="21" srcOrd="0" destOrd="0"/>
+        <dgm:cxn modelId="24" srcId="2" destId="22" srcOrd="1" destOrd="0"/>
+        <dgm:cxn modelId="33" srcId="3" destId="31" srcOrd="0" destOrd="0"/>
+        <dgm:cxn modelId="34" srcId="3" destId="32" srcOrd="1" destOrd="0"/>
+      </dgm:cxnLst>
+      <dgm:bg/>
+      <dgm:whole/>
+    </dgm:dataModel>
+  </dgm:sampData>
+  <dgm:styleData>
+    <dgm:dataModel>
+      <dgm:ptLst>
+        <dgm:pt modelId="0" type="doc"/>
+        <dgm:pt modelId="1"/>
+        <dgm:pt modelId="11"/>
+        <dgm:pt modelId="2"/>
+        <dgm:pt modelId="21"/>
+      </dgm:ptLst>
+      <dgm:cxnLst>
+        <dgm:cxn modelId="4" srcId="0" destId="1" srcOrd="0" destOrd="0"/>
+        <dgm:cxn modelId="5" srcId="0" destId="2" srcOrd="1" destOrd="0"/>
+        <dgm:cxn modelId="13" srcId="1" destId="11" srcOrd="0" destOrd="0"/>
+        <dgm:cxn modelId="23" srcId="2" destId="21" srcOrd="0" destOrd="0"/>
+      </dgm:cxnLst>
+      <dgm:bg/>
+      <dgm:whole/>
+    </dgm:dataModel>
+  </dgm:styleData>
+  <dgm:clrData>
+    <dgm:dataModel>
+      <dgm:ptLst>
+        <dgm:pt modelId="0" type="doc"/>
+        <dgm:pt modelId="1"/>
+        <dgm:pt modelId="11"/>
+        <dgm:pt modelId="2"/>
+        <dgm:pt modelId="21"/>
+        <dgm:pt modelId="3"/>
+        <dgm:pt modelId="31"/>
+        <dgm:pt modelId="4"/>
+        <dgm:pt modelId="41"/>
+      </dgm:ptLst>
+      <dgm:cxnLst>
+        <dgm:cxn modelId="5" srcId="0" destId="1" srcOrd="0" destOrd="0"/>
+        <dgm:cxn modelId="6" srcId="0" destId="2" srcOrd="1" destOrd="0"/>
+        <dgm:cxn modelId="7" srcId="0" destId="3" srcOrd="2" destOrd="0"/>
+        <dgm:cxn modelId="8" srcId="0" destId="4" srcOrd="3" destOrd="0"/>
+        <dgm:cxn modelId="13" srcId="1" destId="11" srcOrd="0" destOrd="0"/>
+        <dgm:cxn modelId="23" srcId="2" destId="21" srcOrd="0" destOrd="0"/>
+        <dgm:cxn modelId="33" srcId="3" destId="31" srcOrd="0" destOrd="0"/>
+        <dgm:cxn modelId="43" srcId="4" destId="41" srcOrd="0" destOrd="0"/>
+      </dgm:cxnLst>
+      <dgm:bg/>
+      <dgm:whole/>
+    </dgm:dataModel>
+  </dgm:clrData>
+  <dgm:layoutNode name="Name0">
+    <dgm:varLst>
+      <dgm:dir/>
+      <dgm:resizeHandles val="exact"/>
+    </dgm:varLst>
+    <dgm:choose name="Name1">
+      <dgm:if name="Name2" func="var" arg="dir" op="equ" val="norm">
+        <dgm:alg type="lin"/>
+      </dgm:if>
+      <dgm:else name="Name3">
+        <dgm:alg type="lin">
+          <dgm:param type="linDir" val="fromR"/>
+        </dgm:alg>
+      </dgm:else>
+    </dgm:choose>
+    <dgm:shape xmlns:r="http://schemas.openxmlformats.org/officeDocument/2006/relationships" r:blip="">
+      <dgm:adjLst/>
+    </dgm:shape>
+    <dgm:presOf/>
+    <dgm:constrLst>
+      <dgm:constr type="h" for="ch" ptType="node" refType="h"/>
+      <dgm:constr type="w" for="ch" ptType="node" refType="w"/>
+      <dgm:constr type="primFontSz" for="ch" ptType="node" op="equ"/>
+      <dgm:constr type="w" for="ch" forName="sibTrans" refType="w" fact="0.075"/>
+    </dgm:constrLst>
+    <dgm:ruleLst/>
+    <dgm:forEach name="nodesForEach" axis="ch" ptType="node">
+      <dgm:layoutNode name="node">
+        <dgm:varLst>
+          <dgm:bulletEnabled val="1"/>
+        </dgm:varLst>
+        <dgm:alg type="tx"/>
+        <dgm:choose name="Name4">
+          <dgm:if name="Name5" func="var" arg="dir" op="equ" val="norm">
+            <dgm:shape xmlns:r="http://schemas.openxmlformats.org/officeDocument/2006/relationships" rot="-90" type="flowChartManualOperation" r:blip="">
+              <dgm:adjLst/>
+            </dgm:shape>
+          </dgm:if>
+          <dgm:else name="Name6">
+            <dgm:shape xmlns:r="http://schemas.openxmlformats.org/officeDocument/2006/relationships" rot="90" type="flowChartManualOperation" r:blip="">
+              <dgm:adjLst/>
+            </dgm:shape>
+          </dgm:else>
+        </dgm:choose>
+        <dgm:presOf axis="desOrSelf" ptType="node"/>
+        <dgm:constrLst>
+          <dgm:constr type="primFontSz" val="65"/>
+          <dgm:constr type="tMarg"/>
+          <dgm:constr type="bMarg"/>
+          <dgm:constr type="lMarg" refType="primFontSz" fact="0.5"/>
+          <dgm:constr type="rMarg" refType="lMarg"/>
+        </dgm:constrLst>
+        <dgm:ruleLst>
+          <dgm:rule type="primFontSz" val="5" fact="NaN" max="NaN"/>
+        </dgm:ruleLst>
+      </dgm:layoutNode>
+      <dgm:forEach name="sibTransForEach" axis="followSib" ptType="sibTrans" cnt="1">
+        <dgm:layoutNode name="sibTrans">
+          <dgm:alg type="sp"/>
+          <dgm:shape xmlns:r="http://schemas.openxmlformats.org/officeDocument/2006/relationships" r:blip="">
+            <dgm:adjLst/>
+          </dgm:shape>
+          <dgm:presOf/>
+          <dgm:constrLst/>
+          <dgm:ruleLst/>
+        </dgm:layoutNode>
+      </dgm:forEach>
+    </dgm:forEach>
+  </dgm:layoutNode>
+</dgm:layoutDef>
+</file>
+
 <file path=ppt/diagrams/quickStyle1.xml><?xml version="1.0" encoding="utf-8"?>
+<dgm:styleDef xmlns:dgm="http://schemas.openxmlformats.org/drawingml/2006/diagram" xmlns:a="http://schemas.openxmlformats.org/drawingml/2006/main" uniqueId="urn:microsoft.com/office/officeart/2005/8/quickstyle/simple1">
+  <dgm:title val=""/>
+  <dgm:desc val=""/>
+  <dgm:catLst>
+    <dgm:cat type="simple" pri="10100"/>
+  </dgm:catLst>
+  <dgm:scene3d>
+    <a:camera prst="orthographicFront"/>
+    <a:lightRig rig="threePt" dir="t"/>
+  </dgm:scene3d>
+  <dgm:styleLbl name="node0">
+    <dgm:scene3d>
+      <a:camera prst="orthographicFront"/>
+      <a:lightRig rig="threePt" dir="t"/>
+    </dgm:scene3d>
+    <dgm:sp3d/>
+    <dgm:txPr/>
+    <dgm:style>
+      <a:lnRef idx="2">
+        <a:scrgbClr r="0" g="0" b="0"/>
+      </a:lnRef>
+      <a:fillRef idx="1">
+        <a:scrgbClr r="0" g="0" b="0"/>
+      </a:fillRef>
+      <a:effectRef idx="0">
+        <a:scrgbClr r="0" g="0" b="0"/>
+      </a:effectRef>
+      <a:fontRef idx="minor">
+        <a:schemeClr val="lt1"/>
+      </a:fontRef>
+    </dgm:style>
+  </dgm:styleLbl>
+  <dgm:styleLbl name="lnNode1">
+    <dgm:scene3d>
+      <a:camera prst="orthographicFront"/>
+      <a:lightRig rig="threePt" dir="t"/>
+    </dgm:scene3d>
+    <dgm:sp3d/>
+    <dgm:txPr/>
+    <dgm:style>
+      <a:lnRef idx="2">
+        <a:scrgbClr r="0" g="0" b="0"/>
+      </a:lnRef>
+      <a:fillRef idx="1">
+        <a:scrgbClr r="0" g="0" b="0"/>
+      </a:fillRef>
+      <a:effectRef idx="0">
+        <a:scrgbClr r="0" g="0" b="0"/>
+      </a:effectRef>
+      <a:fontRef idx="minor">
+        <a:schemeClr val="lt1"/>
+      </a:fontRef>
+    </dgm:style>
+  </dgm:styleLbl>
+  <dgm:styleLbl name="vennNode1">
+    <dgm:scene3d>
+      <a:camera prst="orthographicFront"/>
+      <a:lightRig rig="threePt" dir="t"/>
+    </dgm:scene3d>
+    <dgm:sp3d/>
+    <dgm:txPr/>
+    <dgm:style>
+      <a:lnRef idx="2">
+        <a:scrgbClr r="0" g="0" b="0"/>
+      </a:lnRef>
+      <a:fillRef idx="1">
+        <a:scrgbClr r="0" g="0" b="0"/>
+      </a:fillRef>
+      <a:effectRef idx="0">
+        <a:scrgbClr r="0" g="0" b="0"/>
+      </a:effectRef>
+      <a:fontRef idx="minor">
+        <a:schemeClr val="tx1"/>
+      </a:fontRef>
+    </dgm:style>
+  </dgm:styleLbl>
+  <dgm:styleLbl name="alignNode1">
+    <dgm:scene3d>
+      <a:camera prst="orthographicFront"/>
+      <a:lightRig rig="threePt" dir="t"/>
+    </dgm:scene3d>
+    <dgm:sp3d/>
+    <dgm:txPr/>
+    <dgm:style>
+      <a:lnRef idx="2">
+        <a:scrgbClr r="0" g="0" b="0"/>
+      </a:lnRef>
+      <a:fillRef idx="1">
+        <a:scrgbClr r="0" g="0" b="0"/>
+      </a:fillRef>
+      <a:effectRef idx="0">
+        <a:scrgbClr r="0" g="0" b="0"/>
+      </a:effectRef>
+      <a:fontRef idx="minor">
+        <a:schemeClr val="lt1"/>
+      </a:fontRef>
+    </dgm:style>
+  </dgm:styleLbl>
+  <dgm:styleLbl name="node1">
+    <dgm:scene3d>
+      <a:camera prst="orthographicFront"/>
+      <a:lightRig rig="threePt" dir="t"/>
+    </dgm:scene3d>
+    <dgm:sp3d/>
+    <dgm:txPr/>
+    <dgm:style>
+      <a:lnRef idx="2">
+        <a:scrgbClr r="0" g="0" b="0"/>
+      </a:lnRef>
+      <a:fillRef idx="1">
+        <a:scrgbClr r="0" g="0" b="0"/>
+      </a:fillRef>
+      <a:effectRef idx="0">
+        <a:scrgbClr r="0" g="0" b="0"/>
+      </a:effectRef>
+      <a:fontRef idx="minor">
+        <a:schemeClr val="lt1"/>
+      </a:fontRef>
+    </dgm:style>
+  </dgm:styleLbl>
+  <dgm:styleLbl name="node2">
+    <dgm:scene3d>
+      <a:camera prst="orthographicFront"/>
+      <a:lightRig rig="threePt" dir="t"/>
+    </dgm:scene3d>
+    <dgm:sp3d/>
+    <dgm:txPr/>
+    <dgm:style>
+      <a:lnRef idx="2">
+        <a:scrgbClr r="0" g="0" b="0"/>
+      </a:lnRef>
+      <a:fillRef idx="1">
+        <a:scrgbClr r="0" g="0" b="0"/>
+      </a:fillRef>
+      <a:effectRef idx="0">
+        <a:scrgbClr r="0" g="0" b="0"/>
+      </a:effectRef>
+      <a:fontRef idx="minor">
+        <a:schemeClr val="lt1"/>
+      </a:fontRef>
+    </dgm:style>
+  </dgm:styleLbl>
+  <dgm:styleLbl name="node3">
+    <dgm:scene3d>
+      <a:camera prst="orthographicFront"/>
+      <a:lightRig rig="threePt" dir="t"/>
+    </dgm:scene3d>
+    <dgm:sp3d/>
+    <dgm:txPr/>
+    <dgm:style>
+      <a:lnRef idx="2">
+        <a:scrgbClr r="0" g="0" b="0"/>
+      </a:lnRef>
+      <a:fillRef idx="1">
+        <a:scrgbClr r="0" g="0" b="0"/>
+      </a:fillRef>
+      <a:effectRef idx="0">
+        <a:scrgbClr r="0" g="0" b="0"/>
+      </a:effectRef>
+      <a:fontRef idx="minor">
+        <a:schemeClr val="lt1"/>
+      </a:fontRef>
+    </dgm:style>
+  </dgm:styleLbl>
+  <dgm:styleLbl name="node4">
+    <dgm:scene3d>
+      <a:camera prst="orthographicFront"/>
+      <a:lightRig rig="threePt" dir="t"/>
+    </dgm:scene3d>
+    <dgm:sp3d/>
+    <dgm:txPr/>
+    <dgm:style>
+      <a:lnRef idx="2">
+        <a:scrgbClr r="0" g="0" b="0"/>
+      </a:lnRef>
+      <a:fillRef idx="1">
+        <a:scrgbClr r="0" g="0" b="0"/>
+      </a:fillRef>
+      <a:effectRef idx="0">
+        <a:scrgbClr r="0" g="0" b="0"/>
+      </a:effectRef>
+      <a:fontRef idx="minor">
+        <a:schemeClr val="lt1"/>
+      </a:fontRef>
+    </dgm:style>
+  </dgm:styleLbl>
+  <dgm:styleLbl name="fgImgPlace1">
+    <dgm:scene3d>
+      <a:camera prst="orthographicFront"/>
+      <a:lightRig rig="threePt" dir="t"/>
+    </dgm:scene3d>
+    <dgm:sp3d/>
+    <dgm:txPr/>
+    <dgm:style>
+      <a:lnRef idx="2">
+        <a:scrgbClr r="0" g="0" b="0"/>
+      </a:lnRef>
+      <a:fillRef idx="1">
+        <a:scrgbClr r="0" g="0" b="0"/>
+      </a:fillRef>
+      <a:effectRef idx="0">
+        <a:scrgbClr r="0" g="0" b="0"/>
+      </a:effectRef>
+      <a:fontRef idx="minor"/>
+    </dgm:style>
+  </dgm:styleLbl>
+  <dgm:styleLbl name="alignImgPlace1">
+    <dgm:scene3d>
+      <a:camera prst="orthographicFront"/>
+      <a:lightRig rig="threePt" dir="t"/>
+    </dgm:scene3d>
+    <dgm:sp3d/>
+    <dgm:txPr/>
+    <dgm:style>
+      <a:lnRef idx="2">
+        <a:scrgbClr r="0" g="0" b="0"/>
+      </a:lnRef>
+      <a:fillRef idx="1">
+        <a:scrgbClr r="0" g="0" b="0"/>
+      </a:fillRef>
+      <a:effectRef idx="0">
+        <a:scrgbClr r="0" g="0" b="0"/>
+      </a:effectRef>
+      <a:fontRef idx="minor"/>
+    </dgm:style>
+  </dgm:styleLbl>
+  <dgm:styleLbl name="bgImgPlace1">
+    <dgm:scene3d>
+      <a:camera prst="orthographicFront"/>
+      <a:lightRig rig="threePt" dir="t"/>
+    </dgm:scene3d>
+    <dgm:sp3d/>
+    <dgm:txPr/>
+    <dgm:style>
+      <a:lnRef idx="2">
+        <a:scrgbClr r="0" g="0" b="0"/>
+      </a:lnRef>
+      <a:fillRef idx="1">
+        <a:scrgbClr r="0" g="0" b="0"/>
+      </a:fillRef>
+      <a:effectRef idx="0">
+        <a:scrgbClr r="0" g="0" b="0"/>
+      </a:effectRef>
+      <a:fontRef idx="minor"/>
+    </dgm:style>
+  </dgm:styleLbl>
+  <dgm:styleLbl name="sibTrans2D1">
+    <dgm:scene3d>
+      <a:camera prst="orthographicFront"/>
+      <a:lightRig rig="threePt" dir="t"/>
+    </dgm:scene3d>
+    <dgm:sp3d/>
+    <dgm:txPr/>
+    <dgm:style>
+      <a:lnRef idx="0">
+        <a:scrgbClr r="0" g="0" b="0"/>
+      </a:lnRef>
+      <a:fillRef idx="1">
+        <a:scrgbClr r="0" g="0" b="0"/>
+      </a:fillRef>
+      <a:effectRef idx="0">
+        <a:scrgbClr r="0" g="0" b="0"/>
+      </a:effectRef>
+      <a:fontRef idx="minor">
+        <a:schemeClr val="lt1"/>
+      </a:fontRef>
+    </dgm:style>
+  </dgm:styleLbl>
+  <dgm:styleLbl name="fgSibTrans2D1">
+    <dgm:scene3d>
+      <a:camera prst="orthographicFront"/>
+      <a:lightRig rig="threePt" dir="t"/>
+    </dgm:scene3d>
+    <dgm:sp3d/>
+    <dgm:txPr/>
+    <dgm:style>
+      <a:lnRef idx="0">
+        <a:scrgbClr r="0" g="0" b="0"/>
+      </a:lnRef>
+      <a:fillRef idx="1">
+        <a:scrgbClr r="0" g="0" b="0"/>
+      </a:fillRef>
+      <a:effectRef idx="0">
+        <a:scrgbClr r="0" g="0" b="0"/>
+      </a:effectRef>
+      <a:fontRef idx="minor">
+        <a:schemeClr val="lt1"/>
+      </a:fontRef>
+    </dgm:style>
+  </dgm:styleLbl>
+  <dgm:styleLbl name="bgSibTrans2D1">
+    <dgm:scene3d>
+      <a:camera prst="orthographicFront"/>
+      <a:lightRig rig="threePt" dir="t"/>
+    </dgm:scene3d>
+    <dgm:sp3d/>
+    <dgm:txPr/>
+    <dgm:style>
+      <a:lnRef idx="0">
+        <a:scrgbClr r="0" g="0" b="0"/>
+      </a:lnRef>
+      <a:fillRef idx="1">
+        <a:scrgbClr r="0" g="0" b="0"/>
+      </a:fillRef>
+      <a:effectRef idx="0">
+        <a:scrgbClr r="0" g="0" b="0"/>
+      </a:effectRef>
+      <a:fontRef idx="minor">
+        <a:schemeClr val="lt1"/>
+      </a:fontRef>
+    </dgm:style>
+  </dgm:styleLbl>
+  <dgm:styleLbl name="sibTrans1D1">
+    <dgm:scene3d>
+      <a:camera prst="orthographicFront"/>
+      <a:lightRig rig="threePt" dir="t"/>
+    </dgm:scene3d>
+    <dgm:sp3d/>
+    <dgm:txPr/>
+    <dgm:style>
+      <a:lnRef idx="1">
+        <a:scrgbClr r="0" g="0" b="0"/>
+      </a:lnRef>
+      <a:fillRef idx="0">
+        <a:scrgbClr r="0" g="0" b="0"/>
+      </a:fillRef>
+      <a:effectRef idx="0">
+        <a:scrgbClr r="0" g="0" b="0"/>
+      </a:effectRef>
+      <a:fontRef idx="minor"/>
+    </dgm:style>
+  </dgm:styleLbl>
+  <dgm:styleLbl name="callout">
+    <dgm:scene3d>
+      <a:camera prst="orthographicFront"/>
+      <a:lightRig rig="threePt" dir="t"/>
+    </dgm:scene3d>
+    <dgm:sp3d/>
+    <dgm:txPr/>
+    <dgm:style>
+      <a:lnRef idx="2">
+        <a:scrgbClr r="0" g="0" b="0"/>
+      </a:lnRef>
+      <a:fillRef idx="1">
+        <a:scrgbClr r="0" g="0" b="0"/>
+      </a:fillRef>
+      <a:effectRef idx="0">
+        <a:scrgbClr r="0" g="0" b="0"/>
+      </a:effectRef>
+      <a:fontRef idx="minor"/>
+    </dgm:style>
+  </dgm:styleLbl>
+  <dgm:styleLbl name="asst0">
+    <dgm:scene3d>
+      <a:camera prst="orthographicFront"/>
+      <a:lightRig rig="threePt" dir="t"/>
+    </dgm:scene3d>
+    <dgm:sp3d/>
+    <dgm:txPr/>
+    <dgm:style>
+      <a:lnRef idx="2">
+        <a:scrgbClr r="0" g="0" b="0"/>
+      </a:lnRef>
+      <a:fillRef idx="1">
+        <a:scrgbClr r="0" g="0" b="0"/>
+      </a:fillRef>
+      <a:effectRef idx="0">
+        <a:scrgbClr r="0" g="0" b="0"/>
+      </a:effectRef>
+      <a:fontRef idx="minor">
+        <a:schemeClr val="lt1"/>
+      </a:fontRef>
+    </dgm:style>
+  </dgm:styleLbl>
+  <dgm:styleLbl name="asst1">
+    <dgm:scene3d>
+      <a:camera prst="orthographicFront"/>
+      <a:lightRig rig="threePt" dir="t"/>
+    </dgm:scene3d>
+    <dgm:sp3d/>
+    <dgm:txPr/>
+    <dgm:style>
+      <a:lnRef idx="2">
+        <a:scrgbClr r="0" g="0" b="0"/>
+      </a:lnRef>
+      <a:fillRef idx="1">
+        <a:scrgbClr r="0" g="0" b="0"/>
+      </a:fillRef>
+      <a:effectRef idx="0">
+        <a:scrgbClr r="0" g="0" b="0"/>
+      </a:effectRef>
+      <a:fontRef idx="minor">
+        <a:schemeClr val="lt1"/>
+      </a:fontRef>
+    </dgm:style>
+  </dgm:styleLbl>
+  <dgm:styleLbl name="asst2">
+    <dgm:scene3d>
+      <a:camera prst="orthographicFront"/>
+      <a:lightRig rig="threePt" dir="t"/>
+    </dgm:scene3d>
+    <dgm:sp3d/>
+    <dgm:txPr/>
+    <dgm:style>
+      <a:lnRef idx="2">
+        <a:scrgbClr r="0" g="0" b="0"/>
+      </a:lnRef>
+      <a:fillRef idx="1">
+        <a:scrgbClr r="0" g="0" b="0"/>
+      </a:fillRef>
+      <a:effectRef idx="0">
+        <a:scrgbClr r="0" g="0" b="0"/>
+      </a:effectRef>
+      <a:fontRef idx="minor">
+        <a:schemeClr val="lt1"/>
+      </a:fontRef>
+    </dgm:style>
+  </dgm:styleLbl>
+  <dgm:styleLbl name="asst3">
+    <dgm:scene3d>
+      <a:camera prst="orthographicFront"/>
+      <a:lightRig rig="threePt" dir="t"/>
+    </dgm:scene3d>
+    <dgm:sp3d/>
+    <dgm:txPr/>
+    <dgm:style>
+      <a:lnRef idx="2">
+        <a:scrgbClr r="0" g="0" b="0"/>
+      </a:lnRef>
+      <a:fillRef idx="1">
+        <a:scrgbClr r="0" g="0" b="0"/>
+      </a:fillRef>
+      <a:effectRef idx="0">
+        <a:scrgbClr r="0" g="0" b="0"/>
+      </a:effectRef>
+      <a:fontRef idx="minor">
+        <a:schemeClr val="lt1"/>
+      </a:fontRef>
+    </dgm:style>
+  </dgm:styleLbl>
+  <dgm:styleLbl name="asst4">
+    <dgm:scene3d>
+      <a:camera prst="orthographicFront"/>
+      <a:lightRig rig="threePt" dir="t"/>
+    </dgm:scene3d>
+    <dgm:sp3d/>
+    <dgm:txPr/>
+    <dgm:style>
+      <a:lnRef idx="2">
+        <a:scrgbClr r="0" g="0" b="0"/>
+      </a:lnRef>
+      <a:fillRef idx="1">
+        <a:scrgbClr r="0" g="0" b="0"/>
+      </a:fillRef>
+      <a:effectRef idx="0">
+        <a:scrgbClr r="0" g="0" b="0"/>
+      </a:effectRef>
+      <a:fontRef idx="minor">
+        <a:schemeClr val="lt1"/>
+      </a:fontRef>
+    </dgm:style>
+  </dgm:styleLbl>
+  <dgm:styleLbl name="parChTrans2D1">
+    <dgm:scene3d>
+      <a:camera prst="orthographicFront"/>
+      <a:lightRig rig="threePt" dir="t"/>
+    </dgm:scene3d>
+    <dgm:sp3d/>
+    <dgm:txPr/>
+    <dgm:style>
+      <a:lnRef idx="2">
+        <a:scrgbClr r="0" g="0" b="0"/>
+      </a:lnRef>
+      <a:fillRef idx="1">
+        <a:scrgbClr r="0" g="0" b="0"/>
+      </a:fillRef>
+      <a:effectRef idx="0">
+        <a:scrgbClr r="0" g="0" b="0"/>
+      </a:effectRef>
+      <a:fontRef idx="minor">
+        <a:schemeClr val="lt1"/>
+      </a:fontRef>
+    </dgm:style>
+  </dgm:styleLbl>
+  <dgm:styleLbl name="parChTrans2D2">
+    <dgm:scene3d>
+      <a:camera prst="orthographicFront"/>
+      <a:lightRig rig="threePt" dir="t"/>
+    </dgm:scene3d>
+    <dgm:sp3d/>
+    <dgm:txPr/>
+    <dgm:style>
+      <a:lnRef idx="2">
+        <a:scrgbClr r="0" g="0" b="0"/>
+      </a:lnRef>
+      <a:fillRef idx="1">
+        <a:scrgbClr r="0" g="0" b="0"/>
+      </a:fillRef>
+      <a:effectRef idx="0">
+        <a:scrgbClr r="0" g="0" b="0"/>
+      </a:effectRef>
+      <a:fontRef idx="minor">
+        <a:schemeClr val="lt1"/>
+      </a:fontRef>
+    </dgm:style>
+  </dgm:styleLbl>
+  <dgm:styleLbl name="parChTrans2D3">
+    <dgm:scene3d>
+      <a:camera prst="orthographicFront"/>
+      <a:lightRig rig="threePt" dir="t"/>
+    </dgm:scene3d>
+    <dgm:sp3d/>
+    <dgm:txPr/>
+    <dgm:style>
+      <a:lnRef idx="2">
+        <a:scrgbClr r="0" g="0" b="0"/>
+      </a:lnRef>
+      <a:fillRef idx="1">
+        <a:scrgbClr r="0" g="0" b="0"/>
+      </a:fillRef>
+      <a:effectRef idx="0">
+        <a:scrgbClr r="0" g="0" b="0"/>
+      </a:effectRef>
+      <a:fontRef idx="minor">
+        <a:schemeClr val="lt1"/>
+      </a:fontRef>
+    </dgm:style>
+  </dgm:styleLbl>
+  <dgm:styleLbl name="parChTrans2D4">
+    <dgm:scene3d>
+      <a:camera prst="orthographicFront"/>
+      <a:lightRig rig="threePt" dir="t"/>
+    </dgm:scene3d>
+    <dgm:sp3d/>
+    <dgm:txPr/>
+    <dgm:style>
+      <a:lnRef idx="2">
+        <a:scrgbClr r="0" g="0" b="0"/>
+      </a:lnRef>
+      <a:fillRef idx="1">
+        <a:scrgbClr r="0" g="0" b="0"/>
+      </a:fillRef>
+      <a:effectRef idx="0">
+        <a:scrgbClr r="0" g="0" b="0"/>
+      </a:effectRef>
+      <a:fontRef idx="minor">
+        <a:schemeClr val="lt1"/>
+      </a:fontRef>
+    </dgm:style>
+  </dgm:styleLbl>
+  <dgm:styleLbl name="parChTrans1D1">
+    <dgm:scene3d>
+      <a:camera prst="orthographicFront"/>
+      <a:lightRig rig="threePt" dir="t"/>
+    </dgm:scene3d>
+    <dgm:sp3d/>
+    <dgm:txPr/>
+    <dgm:style>
+      <a:lnRef idx="2">
+        <a:scrgbClr r="0" g="0" b="0"/>
+      </a:lnRef>
+      <a:fillRef idx="0">
+        <a:scrgbClr r="0" g="0" b="0"/>
+      </a:fillRef>
+      <a:effectRef idx="0">
+        <a:scrgbClr r="0" g="0" b="0"/>
+      </a:effectRef>
+      <a:fontRef idx="minor"/>
+    </dgm:style>
+  </dgm:styleLbl>
+  <dgm:styleLbl name="parChTrans1D2">
+    <dgm:scene3d>
+      <a:camera prst="orthographicFront"/>
+      <a:lightRig rig="threePt" dir="t"/>
+    </dgm:scene3d>
+    <dgm:sp3d/>
+    <dgm:txPr/>
+    <dgm:style>
+      <a:lnRef idx="2">
+        <a:scrgbClr r="0" g="0" b="0"/>
+      </a:lnRef>
+      <a:fillRef idx="0">
+        <a:scrgbClr r="0" g="0" b="0"/>
+      </a:fillRef>
+      <a:effectRef idx="0">
+        <a:scrgbClr r="0" g="0" b="0"/>
+      </a:effectRef>
+      <a:fontRef idx="minor"/>
+    </dgm:style>
+  </dgm:styleLbl>
+  <dgm:styleLbl name="parChTrans1D3">
+    <dgm:scene3d>
+      <a:camera prst="orthographicFront"/>
+      <a:lightRig rig="threePt" dir="t"/>
+    </dgm:scene3d>
+    <dgm:sp3d/>
+    <dgm:txPr/>
+    <dgm:style>
+      <a:lnRef idx="2">
+        <a:scrgbClr r="0" g="0" b="0"/>
+      </a:lnRef>
+      <a:fillRef idx="0">
+        <a:scrgbClr r="0" g="0" b="0"/>
+      </a:fillRef>
+      <a:effectRef idx="0">
+        <a:scrgbClr r="0" g="0" b="0"/>
+      </a:effectRef>
+      <a:fontRef idx="minor"/>
+    </dgm:style>
+  </dgm:styleLbl>
+  <dgm:styleLbl name="parChTrans1D4">
+    <dgm:scene3d>
+      <a:camera prst="orthographicFront"/>
+      <a:lightRig rig="threePt" dir="t"/>
+    </dgm:scene3d>
+    <dgm:sp3d/>
+    <dgm:txPr/>
+    <dgm:style>
+      <a:lnRef idx="2">
+        <a:scrgbClr r="0" g="0" b="0"/>
+      </a:lnRef>
+      <a:fillRef idx="0">
+        <a:scrgbClr r="0" g="0" b="0"/>
+      </a:fillRef>
+      <a:effectRef idx="0">
+        <a:scrgbClr r="0" g="0" b="0"/>
+      </a:effectRef>
+      <a:fontRef idx="minor"/>
+    </dgm:style>
+  </dgm:styleLbl>
+  <dgm:styleLbl name="fgAcc1">
+    <dgm:scene3d>
+      <a:camera prst="orthographicFront"/>
+      <a:lightRig rig="threePt" dir="t"/>
+    </dgm:scene3d>
+    <dgm:sp3d/>
+    <dgm:txPr/>
+    <dgm:style>
+      <a:lnRef idx="2">
+        <a:scrgbClr r="0" g="0" b="0"/>
+      </a:lnRef>
+      <a:fillRef idx="1">
+        <a:scrgbClr r="0" g="0" b="0"/>
+      </a:fillRef>
+      <a:effectRef idx="0">
+        <a:scrgbClr r="0" g="0" b="0"/>
+      </a:effectRef>
+      <a:fontRef idx="minor"/>
+    </dgm:style>
+  </dgm:styleLbl>
+  <dgm:styleLbl name="conFgAcc1">
+    <dgm:scene3d>
+      <a:camera prst="orthographicFront"/>
+      <a:lightRig rig="threePt" dir="t"/>
+    </dgm:scene3d>
+    <dgm:sp3d/>
+    <dgm:txPr/>
+    <dgm:style>
+      <a:lnRef idx="2">
+        <a:scrgbClr r="0" g="0" b="0"/>
+      </a:lnRef>
+      <a:fillRef idx="1">
+        <a:scrgbClr r="0" g="0" b="0"/>
+      </a:fillRef>
+      <a:effectRef idx="0">
+        <a:scrgbClr r="0" g="0" b="0"/>
+      </a:effectRef>
+      <a:fontRef idx="minor"/>
+    </dgm:style>
+  </dgm:styleLbl>
+  <dgm:styleLbl name="alignAcc1">
+    <dgm:scene3d>
+      <a:camera prst="orthographicFront"/>
+      <a:lightRig rig="threePt" dir="t"/>
+    </dgm:scene3d>
+    <dgm:sp3d/>
+    <dgm:txPr/>
+    <dgm:style>
+      <a:lnRef idx="2">
+        <a:scrgbClr r="0" g="0" b="0"/>
+      </a:lnRef>
+      <a:fillRef idx="1">
+        <a:scrgbClr r="0" g="0" b="0"/>
+      </a:fillRef>
+      <a:effectRef idx="0">
+        <a:scrgbClr r="0" g="0" b="0"/>
+      </a:effectRef>
+      <a:fontRef idx="minor"/>
+    </dgm:style>
+  </dgm:styleLbl>
+  <dgm:styleLbl name="trAlignAcc1">
+    <dgm:scene3d>
+      <a:camera prst="orthographicFront"/>
+      <a:lightRig rig="threePt" dir="t"/>
+    </dgm:scene3d>
+    <dgm:sp3d/>
+    <dgm:txPr/>
+    <dgm:style>
+      <a:lnRef idx="1">
+        <a:scrgbClr r="0" g="0" b="0"/>
+      </a:lnRef>
+      <a:fillRef idx="1">
+        <a:scrgbClr r="0" g="0" b="0"/>
+      </a:fillRef>
+      <a:effectRef idx="0">
+        <a:scrgbClr r="0" g="0" b="0"/>
+      </a:effectRef>
+      <a:fontRef idx="minor"/>
+    </dgm:style>
+  </dgm:styleLbl>
+  <dgm:styleLbl name="bgAcc1">
+    <dgm:scene3d>
+      <a:camera prst="orthographicFront"/>
+      <a:lightRig rig="threePt" dir="t"/>
+    </dgm:scene3d>
+    <dgm:sp3d/>
+    <dgm:txPr/>
+    <dgm:style>
+      <a:lnRef idx="2">
+        <a:scrgbClr r="0" g="0" b="0"/>
+      </a:lnRef>
+      <a:fillRef idx="1">
+        <a:scrgbClr r="0" g="0" b="0"/>
+      </a:fillRef>
+      <a:effectRef idx="0">
+        <a:scrgbClr r="0" g="0" b="0"/>
+      </a:effectRef>
+      <a:fontRef idx="minor"/>
+    </dgm:style>
+  </dgm:styleLbl>
+  <dgm:styleLbl name="solidFgAcc1">
+    <dgm:scene3d>
+      <a:camera prst="orthographicFront"/>
+      <a:lightRig rig="threePt" dir="t"/>
+    </dgm:scene3d>
+    <dgm:sp3d/>
+    <dgm:txPr/>
+    <dgm:style>
+      <a:lnRef idx="2">
+        <a:scrgbClr r="0" g="0" b="0"/>
+      </a:lnRef>
+      <a:fillRef idx="1">
+        <a:scrgbClr r="0" g="0" b="0"/>
+      </a:fillRef>
+      <a:effectRef idx="0">
+        <a:scrgbClr r="0" g="0" b="0"/>
+      </a:effectRef>
+      <a:fontRef idx="minor"/>
+    </dgm:style>
+  </dgm:styleLbl>
+  <dgm:styleLbl name="solidAlignAcc1">
+    <dgm:scene3d>
+      <a:camera prst="orthographicFront"/>
+      <a:lightRig rig="threePt" dir="t"/>
+    </dgm:scene3d>
+    <dgm:sp3d/>
+    <dgm:txPr/>
+    <dgm:style>
+      <a:lnRef idx="2">
+        <a:scrgbClr r="0" g="0" b="0"/>
+      </a:lnRef>
+      <a:fillRef idx="1">
+        <a:scrgbClr r="0" g="0" b="0"/>
+      </a:fillRef>
+      <a:effectRef idx="0">
+        <a:scrgbClr r="0" g="0" b="0"/>
+      </a:effectRef>
+      <a:fontRef idx="minor"/>
+    </dgm:style>
+  </dgm:styleLbl>
+  <dgm:styleLbl name="solidBgAcc1">
+    <dgm:scene3d>
+      <a:camera prst="orthographicFront"/>
+      <a:lightRig rig="threePt" dir="t"/>
+    </dgm:scene3d>
+    <dgm:sp3d/>
+    <dgm:txPr/>
+    <dgm:style>
+      <a:lnRef idx="2">
+        <a:scrgbClr r="0" g="0" b="0"/>
+      </a:lnRef>
+      <a:fillRef idx="1">
+        <a:scrgbClr r="0" g="0" b="0"/>
+      </a:fillRef>
+      <a:effectRef idx="0">
+        <a:scrgbClr r="0" g="0" b="0"/>
+      </a:effectRef>
+      <a:fontRef idx="minor"/>
+    </dgm:style>
+  </dgm:styleLbl>
+  <dgm:styleLbl name="fgAccFollowNode1">
+    <dgm:scene3d>
+      <a:camera prst="orthographicFront"/>
+      <a:lightRig rig="threePt" dir="t"/>
+    </dgm:scene3d>
+    <dgm:sp3d/>
+    <dgm:txPr/>
+    <dgm:style>
+      <a:lnRef idx="2">
+        <a:scrgbClr r="0" g="0" b="0"/>
+      </a:lnRef>
+      <a:fillRef idx="1">
+        <a:scrgbClr r="0" g="0" b="0"/>
+      </a:fillRef>
+      <a:effectRef idx="0">
+        <a:scrgbClr r="0" g="0" b="0"/>
+      </a:effectRef>
+      <a:fontRef idx="minor"/>
+    </dgm:style>
+  </dgm:styleLbl>
+  <dgm:styleLbl name="alignAccFollowNode1">
+    <dgm:scene3d>
+      <a:camera prst="orthographicFront"/>
+      <a:lightRig rig="threePt" dir="t"/>
+    </dgm:scene3d>
+    <dgm:sp3d/>
+    <dgm:txPr/>
+    <dgm:style>
+      <a:lnRef idx="2">
+        <a:scrgbClr r="0" g="0" b="0"/>
+      </a:lnRef>
+      <a:fillRef idx="1">
+        <a:scrgbClr r="0" g="0" b="0"/>
+      </a:fillRef>
+      <a:effectRef idx="0">
+        <a:scrgbClr r="0" g="0" b="0"/>
+      </a:effectRef>
+      <a:fontRef idx="minor"/>
+    </dgm:style>
+  </dgm:styleLbl>
+  <dgm:styleLbl name="bgAccFollowNode1">
+    <dgm:scene3d>
+      <a:camera prst="orthographicFront"/>
+      <a:lightRig rig="threePt" dir="t"/>
+    </dgm:scene3d>
+    <dgm:sp3d/>
+    <dgm:txPr/>
+    <dgm:style>
+      <a:lnRef idx="2">
+        <a:scrgbClr r="0" g="0" b="0"/>
+      </a:lnRef>
+      <a:fillRef idx="1">
+        <a:scrgbClr r="0" g="0" b="0"/>
+      </a:fillRef>
+      <a:effectRef idx="0">
+        <a:scrgbClr r="0" g="0" b="0"/>
+      </a:effectRef>
+      <a:fontRef idx="minor"/>
+    </dgm:style>
+  </dgm:styleLbl>
+  <dgm:styleLbl name="fgAcc0">
+    <dgm:scene3d>
+      <a:camera prst="orthographicFront"/>
+      <a:lightRig rig="threePt" dir="t"/>
+    </dgm:scene3d>
+    <dgm:sp3d/>
+    <dgm:txPr/>
+    <dgm:style>
+      <a:lnRef idx="2">
+        <a:scrgbClr r="0" g="0" b="0"/>
+      </a:lnRef>
+      <a:fillRef idx="1">
+        <a:scrgbClr r="0" g="0" b="0"/>
+      </a:fillRef>
+      <a:effectRef idx="0">
+        <a:scrgbClr r="0" g="0" b="0"/>
+      </a:effectRef>
+      <a:fontRef idx="minor"/>
+    </dgm:style>
+  </dgm:styleLbl>
+  <dgm:styleLbl name="fgAcc2">
+    <dgm:scene3d>
+      <a:camera prst="orthographicFront"/>
+      <a:lightRig rig="threePt" dir="t"/>
+    </dgm:scene3d>
+    <dgm:sp3d/>
+    <dgm:txPr/>
+    <dgm:style>
+      <a:lnRef idx="2">
+        <a:scrgbClr r="0" g="0" b="0"/>
+      </a:lnRef>
+      <a:fillRef idx="1">
+        <a:scrgbClr r="0" g="0" b="0"/>
+      </a:fillRef>
+      <a:effectRef idx="0">
+        <a:scrgbClr r="0" g="0" b="0"/>
+      </a:effectRef>
+      <a:fontRef idx="minor"/>
+    </dgm:style>
+  </dgm:styleLbl>
+  <dgm:styleLbl name="fgAcc3">
+    <dgm:scene3d>
+      <a:camera prst="orthographicFront"/>
+      <a:lightRig rig="threePt" dir="t"/>
+    </dgm:scene3d>
+    <dgm:sp3d/>
+    <dgm:txPr/>
+    <dgm:style>
+      <a:lnRef idx="2">
+        <a:scrgbClr r="0" g="0" b="0"/>
+      </a:lnRef>
+      <a:fillRef idx="1">
+        <a:scrgbClr r="0" g="0" b="0"/>
+      </a:fillRef>
+      <a:effectRef idx="0">
+        <a:scrgbClr r="0" g="0" b="0"/>
+      </a:effectRef>
+      <a:fontRef idx="minor"/>
+    </dgm:style>
+  </dgm:styleLbl>
+  <dgm:styleLbl name="fgAcc4">
+    <dgm:scene3d>
+      <a:camera prst="orthographicFront"/>
+      <a:lightRig rig="threePt" dir="t"/>
+    </dgm:scene3d>
+    <dgm:sp3d/>
+    <dgm:txPr/>
+    <dgm:style>
+      <a:lnRef idx="2">
+        <a:scrgbClr r="0" g="0" b="0"/>
+      </a:lnRef>
+      <a:fillRef idx="1">
+        <a:scrgbClr r="0" g="0" b="0"/>
+      </a:fillRef>
+      <a:effectRef idx="0">
+        <a:scrgbClr r="0" g="0" b="0"/>
+      </a:effectRef>
+      <a:fontRef idx="minor"/>
+    </dgm:style>
+  </dgm:styleLbl>
+  <dgm:styleLbl name="bgShp">
+    <dgm:scene3d>
+      <a:camera prst="orthographicFront"/>
+      <a:lightRig rig="threePt" dir="t"/>
+    </dgm:scene3d>
+    <dgm:sp3d/>
+    <dgm:txPr/>
+    <dgm:style>
+      <a:lnRef idx="0">
+        <a:scrgbClr r="0" g="0" b="0"/>
+      </a:lnRef>
+      <a:fillRef idx="1">
+        <a:scrgbClr r="0" g="0" b="0"/>
+      </a:fillRef>
+      <a:effectRef idx="0">
+        <a:scrgbClr r="0" g="0" b="0"/>
+      </a:effectRef>
+      <a:fontRef idx="minor"/>
+    </dgm:style>
+  </dgm:styleLbl>
+  <dgm:styleLbl name="dkBgShp">
+    <dgm:scene3d>
+      <a:camera prst="orthographicFront"/>
+      <a:lightRig rig="threePt" dir="t"/>
+    </dgm:scene3d>
+    <dgm:sp3d/>
+    <dgm:txPr/>
+    <dgm:style>
+      <a:lnRef idx="0">
+        <a:scrgbClr r="0" g="0" b="0"/>
+      </a:lnRef>
+      <a:fillRef idx="1">
+        <a:scrgbClr r="0" g="0" b="0"/>
+      </a:fillRef>
+      <a:effectRef idx="0">
+        <a:scrgbClr r="0" g="0" b="0"/>
+      </a:effectRef>
+      <a:fontRef idx="minor"/>
+    </dgm:style>
+  </dgm:styleLbl>
+  <dgm:styleLbl name="trBgShp">
+    <dgm:scene3d>
+      <a:camera prst="orthographicFront"/>
+      <a:lightRig rig="threePt" dir="t"/>
+    </dgm:scene3d>
+    <dgm:sp3d/>
+    <dgm:txPr/>
+    <dgm:style>
+      <a:lnRef idx="0">
+        <a:scrgbClr r="0" g="0" b="0"/>
+      </a:lnRef>
+      <a:fillRef idx="1">
+        <a:scrgbClr r="0" g="0" b="0"/>
+      </a:fillRef>
+      <a:effectRef idx="0">
+        <a:scrgbClr r="0" g="0" b="0"/>
+      </a:effectRef>
+      <a:fontRef idx="minor"/>
+    </dgm:style>
+  </dgm:styleLbl>
+  <dgm:styleLbl name="fgShp">
+    <dgm:scene3d>
+      <a:camera prst="orthographicFront"/>
+      <a:lightRig rig="threePt" dir="t"/>
+    </dgm:scene3d>
+    <dgm:sp3d/>
+    <dgm:txPr/>
+    <dgm:style>
+      <a:lnRef idx="2">
+        <a:scrgbClr r="0" g="0" b="0"/>
+      </a:lnRef>
+      <a:fillRef idx="1">
+        <a:scrgbClr r="0" g="0" b="0"/>
+      </a:fillRef>
+      <a:effectRef idx="0">
+        <a:scrgbClr r="0" g="0" b="0"/>
+      </a:effectRef>
+      <a:fontRef idx="minor"/>
+    </dgm:style>
+  </dgm:styleLbl>
+  <dgm:styleLbl name="revTx">
+    <dgm:scene3d>
+      <a:camera prst="orthographicFront"/>
+      <a:lightRig rig="threePt" dir="t"/>
+    </dgm:scene3d>
+    <dgm:sp3d/>
+    <dgm:txPr/>
+    <dgm:style>
+      <a:lnRef idx="0">
+        <a:scrgbClr r="0" g="0" b="0"/>
+      </a:lnRef>
+      <a:fillRef idx="0">
+        <a:scrgbClr r="0" g="0" b="0"/>
+      </a:fillRef>
+      <a:effectRef idx="0">
+        <a:scrgbClr r="0" g="0" b="0"/>
+      </a:effectRef>
+      <a:fontRef idx="minor"/>
+    </dgm:style>
+  </dgm:styleLbl>
+</dgm:styleDef>
+</file>
+
+<file path=ppt/diagrams/quickStyle2.xml><?xml version="1.0" encoding="utf-8"?>
 <dgm:styleDef xmlns:dgm="http://schemas.openxmlformats.org/drawingml/2006/diagram" xmlns:a="http://schemas.openxmlformats.org/drawingml/2006/main" uniqueId="urn:microsoft.com/office/officeart/2005/8/quickstyle/simple1">
   <dgm:title val=""/>
   <dgm:desc val=""/>
@@ -10599,6 +13442,178 @@
     <p:extLst>
       <p:ext uri="{BB962C8B-B14F-4D97-AF65-F5344CB8AC3E}">
         <p14:creationId xmlns:p14="http://schemas.microsoft.com/office/powerpoint/2010/main" val="2068959356"/>
+      </p:ext>
+    </p:extLst>
+  </p:cSld>
+  <p:clrMapOvr>
+    <a:masterClrMapping/>
+  </p:clrMapOvr>
+</p:sld>
+</file>
+
+<file path=ppt/slides/slide3.xml><?xml version="1.0" encoding="utf-8"?>
+<p:sld xmlns:a="http://schemas.openxmlformats.org/drawingml/2006/main" xmlns:r="http://schemas.openxmlformats.org/officeDocument/2006/relationships" xmlns:p="http://schemas.openxmlformats.org/presentationml/2006/main">
+  <p:cSld>
+    <p:spTree>
+      <p:nvGrpSpPr>
+        <p:cNvPr id="1" name=""/>
+        <p:cNvGrpSpPr/>
+        <p:nvPr/>
+      </p:nvGrpSpPr>
+      <p:grpSpPr>
+        <a:xfrm>
+          <a:off x="0" y="0"/>
+          <a:ext cx="0" cy="0"/>
+          <a:chOff x="0" y="0"/>
+          <a:chExt cx="0" cy="0"/>
+        </a:xfrm>
+      </p:grpSpPr>
+      <p:sp>
+        <p:nvSpPr>
+          <p:cNvPr id="2" name="Title 1">
+            <a:extLst>
+              <a:ext uri="{FF2B5EF4-FFF2-40B4-BE49-F238E27FC236}">
+                <a16:creationId xmlns:a16="http://schemas.microsoft.com/office/drawing/2014/main" id="{5324C619-FE50-CB93-BA00-035678D56F8B}"/>
+              </a:ext>
+            </a:extLst>
+          </p:cNvPr>
+          <p:cNvSpPr>
+            <a:spLocks noGrp="1"/>
+          </p:cNvSpPr>
+          <p:nvPr>
+            <p:ph type="title"/>
+          </p:nvPr>
+        </p:nvSpPr>
+        <p:spPr/>
+        <p:txBody>
+          <a:bodyPr/>
+          <a:lstStyle/>
+          <a:p>
+            <a:r>
+              <a:rPr lang="en-US" dirty="0"/>
+              <a:t>Compaction strategies</a:t>
+            </a:r>
+          </a:p>
+        </p:txBody>
+      </p:sp>
+      <p:sp>
+        <p:nvSpPr>
+          <p:cNvPr id="3" name="Content Placeholder 2">
+            <a:extLst>
+              <a:ext uri="{FF2B5EF4-FFF2-40B4-BE49-F238E27FC236}">
+                <a16:creationId xmlns:a16="http://schemas.microsoft.com/office/drawing/2014/main" id="{47075A47-C532-0BF2-0523-D339D0C57185}"/>
+              </a:ext>
+            </a:extLst>
+          </p:cNvPr>
+          <p:cNvSpPr>
+            <a:spLocks noGrp="1"/>
+          </p:cNvSpPr>
+          <p:nvPr>
+            <p:ph idx="1"/>
+          </p:nvPr>
+        </p:nvSpPr>
+        <p:spPr/>
+        <p:txBody>
+          <a:bodyPr/>
+          <a:lstStyle/>
+          <a:p>
+            <a:endParaRPr lang="en-US"/>
+          </a:p>
+        </p:txBody>
+      </p:sp>
+    </p:spTree>
+    <p:extLst>
+      <p:ext uri="{BB962C8B-B14F-4D97-AF65-F5344CB8AC3E}">
+        <p14:creationId xmlns:p14="http://schemas.microsoft.com/office/powerpoint/2010/main" val="1739960722"/>
+      </p:ext>
+    </p:extLst>
+  </p:cSld>
+  <p:clrMapOvr>
+    <a:masterClrMapping/>
+  </p:clrMapOvr>
+</p:sld>
+</file>
+
+<file path=ppt/slides/slide4.xml><?xml version="1.0" encoding="utf-8"?>
+<p:sld xmlns:a="http://schemas.openxmlformats.org/drawingml/2006/main" xmlns:r="http://schemas.openxmlformats.org/officeDocument/2006/relationships" xmlns:p="http://schemas.openxmlformats.org/presentationml/2006/main">
+  <p:cSld>
+    <p:spTree>
+      <p:nvGrpSpPr>
+        <p:cNvPr id="1" name=""/>
+        <p:cNvGrpSpPr/>
+        <p:nvPr/>
+      </p:nvGrpSpPr>
+      <p:grpSpPr>
+        <a:xfrm>
+          <a:off x="0" y="0"/>
+          <a:ext cx="0" cy="0"/>
+          <a:chOff x="0" y="0"/>
+          <a:chExt cx="0" cy="0"/>
+        </a:xfrm>
+      </p:grpSpPr>
+      <p:sp>
+        <p:nvSpPr>
+          <p:cNvPr id="2" name="Title 1">
+            <a:extLst>
+              <a:ext uri="{FF2B5EF4-FFF2-40B4-BE49-F238E27FC236}">
+                <a16:creationId xmlns:a16="http://schemas.microsoft.com/office/drawing/2014/main" id="{6C7E91F6-0013-822F-8C02-E7AE48882305}"/>
+              </a:ext>
+            </a:extLst>
+          </p:cNvPr>
+          <p:cNvSpPr>
+            <a:spLocks noGrp="1"/>
+          </p:cNvSpPr>
+          <p:nvPr>
+            <p:ph type="title"/>
+          </p:nvPr>
+        </p:nvSpPr>
+        <p:spPr/>
+        <p:txBody>
+          <a:bodyPr/>
+          <a:lstStyle/>
+          <a:p>
+            <a:r>
+              <a:rPr lang="en-US" dirty="0"/>
+              <a:t>Agent types</a:t>
+            </a:r>
+          </a:p>
+        </p:txBody>
+      </p:sp>
+      <p:graphicFrame>
+        <p:nvGraphicFramePr>
+          <p:cNvPr id="4" name="Content Placeholder 3">
+            <a:extLst>
+              <a:ext uri="{FF2B5EF4-FFF2-40B4-BE49-F238E27FC236}">
+                <a16:creationId xmlns:a16="http://schemas.microsoft.com/office/drawing/2014/main" id="{F0B03CF3-97CF-6C9D-E850-73C74E91BC14}"/>
+              </a:ext>
+            </a:extLst>
+          </p:cNvPr>
+          <p:cNvGraphicFramePr>
+            <a:graphicFrameLocks noGrp="1"/>
+          </p:cNvGraphicFramePr>
+          <p:nvPr>
+            <p:ph idx="1"/>
+            <p:extLst>
+              <p:ext uri="{D42A27DB-BD31-4B8C-83A1-F6EECF244321}">
+                <p14:modId xmlns:p14="http://schemas.microsoft.com/office/powerpoint/2010/main" val="429827169"/>
+              </p:ext>
+            </p:extLst>
+          </p:nvPr>
+        </p:nvGraphicFramePr>
+        <p:xfrm>
+          <a:off x="685800" y="2141538"/>
+          <a:ext cx="10131425" cy="3649662"/>
+        </p:xfrm>
+        <a:graphic>
+          <a:graphicData uri="http://schemas.openxmlformats.org/drawingml/2006/diagram">
+            <dgm:relIds xmlns:dgm="http://schemas.openxmlformats.org/drawingml/2006/diagram" xmlns:r="http://schemas.openxmlformats.org/officeDocument/2006/relationships" r:dm="rId2" r:lo="rId3" r:qs="rId4" r:cs="rId5"/>
+          </a:graphicData>
+        </a:graphic>
+      </p:graphicFrame>
+    </p:spTree>
+    <p:extLst>
+      <p:ext uri="{BB962C8B-B14F-4D97-AF65-F5344CB8AC3E}">
+        <p14:creationId xmlns:p14="http://schemas.microsoft.com/office/powerpoint/2010/main" val="3904205288"/>
       </p:ext>
     </p:extLst>
   </p:cSld>

</xml_diff>